<commit_message>
changes ppt file to the repository
</commit_message>
<xml_diff>
--- a/Variant5.pptx
+++ b/Variant5.pptx
@@ -4,12 +4,16 @@
   <p:sldMasterIdLst>
     <p:sldMasterId id="2147483648" r:id="rId1"/>
   </p:sldMasterIdLst>
+  <p:notesMasterIdLst>
+    <p:notesMasterId r:id="rId8"/>
+  </p:notesMasterIdLst>
   <p:sldIdLst>
     <p:sldId id="256" r:id="rId2"/>
     <p:sldId id="257" r:id="rId3"/>
     <p:sldId id="258" r:id="rId4"/>
-    <p:sldId id="259" r:id="rId5"/>
-    <p:sldId id="260" r:id="rId6"/>
+    <p:sldId id="261" r:id="rId5"/>
+    <p:sldId id="259" r:id="rId6"/>
+    <p:sldId id="260" r:id="rId7"/>
   </p:sldIdLst>
   <p:sldSz cx="12192000" cy="6858000"/>
   <p:notesSz cx="6858000" cy="9144000"/>
@@ -116,6 +120,440 @@
 </p:presentation>
 </file>
 
+<file path=ppt/notesMasters/notesMaster1.xml><?xml version="1.0" encoding="utf-8"?>
+<p:notesMaster xmlns:a="http://schemas.openxmlformats.org/drawingml/2006/main" xmlns:r="http://schemas.openxmlformats.org/officeDocument/2006/relationships" xmlns:p="http://schemas.openxmlformats.org/presentationml/2006/main">
+  <p:cSld>
+    <p:bg>
+      <p:bgRef idx="1001">
+        <a:schemeClr val="bg1"/>
+      </p:bgRef>
+    </p:bg>
+    <p:spTree>
+      <p:nvGrpSpPr>
+        <p:cNvPr id="1" name=""/>
+        <p:cNvGrpSpPr/>
+        <p:nvPr/>
+      </p:nvGrpSpPr>
+      <p:grpSpPr>
+        <a:xfrm>
+          <a:off x="0" y="0"/>
+          <a:ext cx="0" cy="0"/>
+          <a:chOff x="0" y="0"/>
+          <a:chExt cx="0" cy="0"/>
+        </a:xfrm>
+      </p:grpSpPr>
+      <p:sp>
+        <p:nvSpPr>
+          <p:cNvPr id="2" name="Header Placeholder 1"/>
+          <p:cNvSpPr>
+            <a:spLocks noGrp="1"/>
+          </p:cNvSpPr>
+          <p:nvPr>
+            <p:ph type="hdr" sz="quarter"/>
+          </p:nvPr>
+        </p:nvSpPr>
+        <p:spPr>
+          <a:xfrm>
+            <a:off x="0" y="0"/>
+            <a:ext cx="2971800" cy="458788"/>
+          </a:xfrm>
+          <a:prstGeom prst="rect">
+            <a:avLst/>
+          </a:prstGeom>
+        </p:spPr>
+        <p:txBody>
+          <a:bodyPr vert="horz" lIns="91440" tIns="45720" rIns="91440" bIns="45720" rtlCol="0"/>
+          <a:lstStyle>
+            <a:lvl1pPr algn="l">
+              <a:defRPr sz="1200"/>
+            </a:lvl1pPr>
+          </a:lstStyle>
+          <a:p>
+            <a:endParaRPr lang="en-US"/>
+          </a:p>
+        </p:txBody>
+      </p:sp>
+      <p:sp>
+        <p:nvSpPr>
+          <p:cNvPr id="3" name="Date Placeholder 2"/>
+          <p:cNvSpPr>
+            <a:spLocks noGrp="1"/>
+          </p:cNvSpPr>
+          <p:nvPr>
+            <p:ph type="dt" idx="1"/>
+          </p:nvPr>
+        </p:nvSpPr>
+        <p:spPr>
+          <a:xfrm>
+            <a:off x="3884613" y="0"/>
+            <a:ext cx="2971800" cy="458788"/>
+          </a:xfrm>
+          <a:prstGeom prst="rect">
+            <a:avLst/>
+          </a:prstGeom>
+        </p:spPr>
+        <p:txBody>
+          <a:bodyPr vert="horz" lIns="91440" tIns="45720" rIns="91440" bIns="45720" rtlCol="0"/>
+          <a:lstStyle>
+            <a:lvl1pPr algn="r">
+              <a:defRPr sz="1200"/>
+            </a:lvl1pPr>
+          </a:lstStyle>
+          <a:p>
+            <a:fld id="{D1468B6B-BCA7-E54C-B787-6B74196380E8}" type="datetimeFigureOut">
+              <a:rPr lang="en-US" smtClean="0"/>
+              <a:t>9/13/22</a:t>
+            </a:fld>
+            <a:endParaRPr lang="en-US"/>
+          </a:p>
+        </p:txBody>
+      </p:sp>
+      <p:sp>
+        <p:nvSpPr>
+          <p:cNvPr id="4" name="Slide Image Placeholder 3"/>
+          <p:cNvSpPr>
+            <a:spLocks noGrp="1" noRot="1" noChangeAspect="1"/>
+          </p:cNvSpPr>
+          <p:nvPr>
+            <p:ph type="sldImg" idx="2"/>
+          </p:nvPr>
+        </p:nvSpPr>
+        <p:spPr>
+          <a:xfrm>
+            <a:off x="685800" y="1143000"/>
+            <a:ext cx="5486400" cy="3086100"/>
+          </a:xfrm>
+          <a:prstGeom prst="rect">
+            <a:avLst/>
+          </a:prstGeom>
+          <a:noFill/>
+          <a:ln w="12700">
+            <a:solidFill>
+              <a:prstClr val="black"/>
+            </a:solidFill>
+          </a:ln>
+        </p:spPr>
+        <p:txBody>
+          <a:bodyPr vert="horz" lIns="91440" tIns="45720" rIns="91440" bIns="45720" rtlCol="0" anchor="ctr"/>
+          <a:lstStyle/>
+          <a:p>
+            <a:endParaRPr lang="en-US"/>
+          </a:p>
+        </p:txBody>
+      </p:sp>
+      <p:sp>
+        <p:nvSpPr>
+          <p:cNvPr id="5" name="Notes Placeholder 4"/>
+          <p:cNvSpPr>
+            <a:spLocks noGrp="1"/>
+          </p:cNvSpPr>
+          <p:nvPr>
+            <p:ph type="body" sz="quarter" idx="3"/>
+          </p:nvPr>
+        </p:nvSpPr>
+        <p:spPr>
+          <a:xfrm>
+            <a:off x="685800" y="4400550"/>
+            <a:ext cx="5486400" cy="3600450"/>
+          </a:xfrm>
+          <a:prstGeom prst="rect">
+            <a:avLst/>
+          </a:prstGeom>
+        </p:spPr>
+        <p:txBody>
+          <a:bodyPr vert="horz" lIns="91440" tIns="45720" rIns="91440" bIns="45720" rtlCol="0"/>
+          <a:lstStyle/>
+          <a:p>
+            <a:pPr lvl="0"/>
+            <a:r>
+              <a:rPr lang="en-US" smtClean="0"/>
+              <a:t>Click to edit Master text styles</a:t>
+            </a:r>
+          </a:p>
+          <a:p>
+            <a:pPr lvl="1"/>
+            <a:r>
+              <a:rPr lang="en-US" smtClean="0"/>
+              <a:t>Second level</a:t>
+            </a:r>
+          </a:p>
+          <a:p>
+            <a:pPr lvl="2"/>
+            <a:r>
+              <a:rPr lang="en-US" smtClean="0"/>
+              <a:t>Third level</a:t>
+            </a:r>
+          </a:p>
+          <a:p>
+            <a:pPr lvl="3"/>
+            <a:r>
+              <a:rPr lang="en-US" smtClean="0"/>
+              <a:t>Fourth level</a:t>
+            </a:r>
+          </a:p>
+          <a:p>
+            <a:pPr lvl="4"/>
+            <a:r>
+              <a:rPr lang="en-US" smtClean="0"/>
+              <a:t>Fifth level</a:t>
+            </a:r>
+            <a:endParaRPr lang="en-US"/>
+          </a:p>
+        </p:txBody>
+      </p:sp>
+      <p:sp>
+        <p:nvSpPr>
+          <p:cNvPr id="6" name="Footer Placeholder 5"/>
+          <p:cNvSpPr>
+            <a:spLocks noGrp="1"/>
+          </p:cNvSpPr>
+          <p:nvPr>
+            <p:ph type="ftr" sz="quarter" idx="4"/>
+          </p:nvPr>
+        </p:nvSpPr>
+        <p:spPr>
+          <a:xfrm>
+            <a:off x="0" y="8685213"/>
+            <a:ext cx="2971800" cy="458787"/>
+          </a:xfrm>
+          <a:prstGeom prst="rect">
+            <a:avLst/>
+          </a:prstGeom>
+        </p:spPr>
+        <p:txBody>
+          <a:bodyPr vert="horz" lIns="91440" tIns="45720" rIns="91440" bIns="45720" rtlCol="0" anchor="b"/>
+          <a:lstStyle>
+            <a:lvl1pPr algn="l">
+              <a:defRPr sz="1200"/>
+            </a:lvl1pPr>
+          </a:lstStyle>
+          <a:p>
+            <a:endParaRPr lang="en-US"/>
+          </a:p>
+        </p:txBody>
+      </p:sp>
+      <p:sp>
+        <p:nvSpPr>
+          <p:cNvPr id="7" name="Slide Number Placeholder 6"/>
+          <p:cNvSpPr>
+            <a:spLocks noGrp="1"/>
+          </p:cNvSpPr>
+          <p:nvPr>
+            <p:ph type="sldNum" sz="quarter" idx="5"/>
+          </p:nvPr>
+        </p:nvSpPr>
+        <p:spPr>
+          <a:xfrm>
+            <a:off x="3884613" y="8685213"/>
+            <a:ext cx="2971800" cy="458787"/>
+          </a:xfrm>
+          <a:prstGeom prst="rect">
+            <a:avLst/>
+          </a:prstGeom>
+        </p:spPr>
+        <p:txBody>
+          <a:bodyPr vert="horz" lIns="91440" tIns="45720" rIns="91440" bIns="45720" rtlCol="0" anchor="b"/>
+          <a:lstStyle>
+            <a:lvl1pPr algn="r">
+              <a:defRPr sz="1200"/>
+            </a:lvl1pPr>
+          </a:lstStyle>
+          <a:p>
+            <a:fld id="{D6464353-B616-9944-BCEE-EA3A280C966C}" type="slidenum">
+              <a:rPr lang="en-US" smtClean="0"/>
+              <a:t>‹#›</a:t>
+            </a:fld>
+            <a:endParaRPr lang="en-US"/>
+          </a:p>
+        </p:txBody>
+      </p:sp>
+    </p:spTree>
+    <p:extLst>
+      <p:ext uri="{BB962C8B-B14F-4D97-AF65-F5344CB8AC3E}">
+        <p14:creationId xmlns:p14="http://schemas.microsoft.com/office/powerpoint/2010/main" val="1432933354"/>
+      </p:ext>
+    </p:extLst>
+  </p:cSld>
+  <p:clrMap bg1="lt1" tx1="dk1" bg2="lt2" tx2="dk2" accent1="accent1" accent2="accent2" accent3="accent3" accent4="accent4" accent5="accent5" accent6="accent6" hlink="hlink" folHlink="folHlink"/>
+  <p:notesStyle>
+    <a:lvl1pPr marL="0" algn="l" defTabSz="914400" rtl="0" eaLnBrk="1" latinLnBrk="0" hangingPunct="1">
+      <a:defRPr sz="1200" kern="1200">
+        <a:solidFill>
+          <a:schemeClr val="tx1"/>
+        </a:solidFill>
+        <a:latin typeface="+mn-lt"/>
+        <a:ea typeface="+mn-ea"/>
+        <a:cs typeface="+mn-cs"/>
+      </a:defRPr>
+    </a:lvl1pPr>
+    <a:lvl2pPr marL="457200" algn="l" defTabSz="914400" rtl="0" eaLnBrk="1" latinLnBrk="0" hangingPunct="1">
+      <a:defRPr sz="1200" kern="1200">
+        <a:solidFill>
+          <a:schemeClr val="tx1"/>
+        </a:solidFill>
+        <a:latin typeface="+mn-lt"/>
+        <a:ea typeface="+mn-ea"/>
+        <a:cs typeface="+mn-cs"/>
+      </a:defRPr>
+    </a:lvl2pPr>
+    <a:lvl3pPr marL="914400" algn="l" defTabSz="914400" rtl="0" eaLnBrk="1" latinLnBrk="0" hangingPunct="1">
+      <a:defRPr sz="1200" kern="1200">
+        <a:solidFill>
+          <a:schemeClr val="tx1"/>
+        </a:solidFill>
+        <a:latin typeface="+mn-lt"/>
+        <a:ea typeface="+mn-ea"/>
+        <a:cs typeface="+mn-cs"/>
+      </a:defRPr>
+    </a:lvl3pPr>
+    <a:lvl4pPr marL="1371600" algn="l" defTabSz="914400" rtl="0" eaLnBrk="1" latinLnBrk="0" hangingPunct="1">
+      <a:defRPr sz="1200" kern="1200">
+        <a:solidFill>
+          <a:schemeClr val="tx1"/>
+        </a:solidFill>
+        <a:latin typeface="+mn-lt"/>
+        <a:ea typeface="+mn-ea"/>
+        <a:cs typeface="+mn-cs"/>
+      </a:defRPr>
+    </a:lvl4pPr>
+    <a:lvl5pPr marL="1828800" algn="l" defTabSz="914400" rtl="0" eaLnBrk="1" latinLnBrk="0" hangingPunct="1">
+      <a:defRPr sz="1200" kern="1200">
+        <a:solidFill>
+          <a:schemeClr val="tx1"/>
+        </a:solidFill>
+        <a:latin typeface="+mn-lt"/>
+        <a:ea typeface="+mn-ea"/>
+        <a:cs typeface="+mn-cs"/>
+      </a:defRPr>
+    </a:lvl5pPr>
+    <a:lvl6pPr marL="2286000" algn="l" defTabSz="914400" rtl="0" eaLnBrk="1" latinLnBrk="0" hangingPunct="1">
+      <a:defRPr sz="1200" kern="1200">
+        <a:solidFill>
+          <a:schemeClr val="tx1"/>
+        </a:solidFill>
+        <a:latin typeface="+mn-lt"/>
+        <a:ea typeface="+mn-ea"/>
+        <a:cs typeface="+mn-cs"/>
+      </a:defRPr>
+    </a:lvl6pPr>
+    <a:lvl7pPr marL="2743200" algn="l" defTabSz="914400" rtl="0" eaLnBrk="1" latinLnBrk="0" hangingPunct="1">
+      <a:defRPr sz="1200" kern="1200">
+        <a:solidFill>
+          <a:schemeClr val="tx1"/>
+        </a:solidFill>
+        <a:latin typeface="+mn-lt"/>
+        <a:ea typeface="+mn-ea"/>
+        <a:cs typeface="+mn-cs"/>
+      </a:defRPr>
+    </a:lvl7pPr>
+    <a:lvl8pPr marL="3200400" algn="l" defTabSz="914400" rtl="0" eaLnBrk="1" latinLnBrk="0" hangingPunct="1">
+      <a:defRPr sz="1200" kern="1200">
+        <a:solidFill>
+          <a:schemeClr val="tx1"/>
+        </a:solidFill>
+        <a:latin typeface="+mn-lt"/>
+        <a:ea typeface="+mn-ea"/>
+        <a:cs typeface="+mn-cs"/>
+      </a:defRPr>
+    </a:lvl8pPr>
+    <a:lvl9pPr marL="3657600" algn="l" defTabSz="914400" rtl="0" eaLnBrk="1" latinLnBrk="0" hangingPunct="1">
+      <a:defRPr sz="1200" kern="1200">
+        <a:solidFill>
+          <a:schemeClr val="tx1"/>
+        </a:solidFill>
+        <a:latin typeface="+mn-lt"/>
+        <a:ea typeface="+mn-ea"/>
+        <a:cs typeface="+mn-cs"/>
+      </a:defRPr>
+    </a:lvl9pPr>
+  </p:notesStyle>
+</p:notesMaster>
+</file>
+
+<file path=ppt/notesSlides/notesSlide1.xml><?xml version="1.0" encoding="utf-8"?>
+<p:notes xmlns:a="http://schemas.openxmlformats.org/drawingml/2006/main" xmlns:r="http://schemas.openxmlformats.org/officeDocument/2006/relationships" xmlns:p="http://schemas.openxmlformats.org/presentationml/2006/main">
+  <p:cSld>
+    <p:spTree>
+      <p:nvGrpSpPr>
+        <p:cNvPr id="1" name=""/>
+        <p:cNvGrpSpPr/>
+        <p:nvPr/>
+      </p:nvGrpSpPr>
+      <p:grpSpPr>
+        <a:xfrm>
+          <a:off x="0" y="0"/>
+          <a:ext cx="0" cy="0"/>
+          <a:chOff x="0" y="0"/>
+          <a:chExt cx="0" cy="0"/>
+        </a:xfrm>
+      </p:grpSpPr>
+      <p:sp>
+        <p:nvSpPr>
+          <p:cNvPr id="2" name="Slide Image Placeholder 1"/>
+          <p:cNvSpPr>
+            <a:spLocks noGrp="1" noRot="1" noChangeAspect="1"/>
+          </p:cNvSpPr>
+          <p:nvPr>
+            <p:ph type="sldImg"/>
+          </p:nvPr>
+        </p:nvSpPr>
+        <p:spPr/>
+      </p:sp>
+      <p:sp>
+        <p:nvSpPr>
+          <p:cNvPr id="3" name="Notes Placeholder 2"/>
+          <p:cNvSpPr>
+            <a:spLocks noGrp="1"/>
+          </p:cNvSpPr>
+          <p:nvPr>
+            <p:ph type="body" idx="1"/>
+          </p:nvPr>
+        </p:nvSpPr>
+        <p:spPr/>
+        <p:txBody>
+          <a:bodyPr/>
+          <a:lstStyle/>
+          <a:p>
+            <a:endParaRPr lang="en-US" dirty="0"/>
+          </a:p>
+        </p:txBody>
+      </p:sp>
+      <p:sp>
+        <p:nvSpPr>
+          <p:cNvPr id="4" name="Slide Number Placeholder 3"/>
+          <p:cNvSpPr>
+            <a:spLocks noGrp="1"/>
+          </p:cNvSpPr>
+          <p:nvPr>
+            <p:ph type="sldNum" sz="quarter" idx="10"/>
+          </p:nvPr>
+        </p:nvSpPr>
+        <p:spPr/>
+        <p:txBody>
+          <a:bodyPr/>
+          <a:lstStyle/>
+          <a:p>
+            <a:fld id="{D6464353-B616-9944-BCEE-EA3A280C966C}" type="slidenum">
+              <a:rPr lang="en-US" smtClean="0"/>
+              <a:t>5</a:t>
+            </a:fld>
+            <a:endParaRPr lang="en-US"/>
+          </a:p>
+        </p:txBody>
+      </p:sp>
+    </p:spTree>
+    <p:extLst>
+      <p:ext uri="{BB962C8B-B14F-4D97-AF65-F5344CB8AC3E}">
+        <p14:creationId xmlns:p14="http://schemas.microsoft.com/office/powerpoint/2010/main" val="1429263220"/>
+      </p:ext>
+    </p:extLst>
+  </p:cSld>
+  <p:clrMapOvr>
+    <a:masterClrMapping/>
+  </p:clrMapOvr>
+</p:notes>
+</file>
+
 <file path=ppt/slideLayouts/slideLayout1.xml><?xml version="1.0" encoding="utf-8"?>
 <p:sldLayout xmlns:a="http://schemas.openxmlformats.org/drawingml/2006/main" xmlns:r="http://schemas.openxmlformats.org/officeDocument/2006/relationships" xmlns:p="http://schemas.openxmlformats.org/presentationml/2006/main" type="title" preserve="1">
   <p:cSld name="Title Slide">
@@ -247,7 +685,7 @@
           <a:p>
             <a:fld id="{20206855-7A26-4E46-9559-23EAE08BDA85}" type="datetimeFigureOut">
               <a:rPr lang="en-US" smtClean="0"/>
-              <a:t>9/8/22</a:t>
+              <a:t>9/13/22</a:t>
             </a:fld>
             <a:endParaRPr lang="en-US"/>
           </a:p>
@@ -417,7 +855,7 @@
           <a:p>
             <a:fld id="{20206855-7A26-4E46-9559-23EAE08BDA85}" type="datetimeFigureOut">
               <a:rPr lang="en-US" smtClean="0"/>
-              <a:t>9/8/22</a:t>
+              <a:t>9/13/22</a:t>
             </a:fld>
             <a:endParaRPr lang="en-US"/>
           </a:p>
@@ -597,7 +1035,7 @@
           <a:p>
             <a:fld id="{20206855-7A26-4E46-9559-23EAE08BDA85}" type="datetimeFigureOut">
               <a:rPr lang="en-US" smtClean="0"/>
-              <a:t>9/8/22</a:t>
+              <a:t>9/13/22</a:t>
             </a:fld>
             <a:endParaRPr lang="en-US"/>
           </a:p>
@@ -767,7 +1205,7 @@
           <a:p>
             <a:fld id="{20206855-7A26-4E46-9559-23EAE08BDA85}" type="datetimeFigureOut">
               <a:rPr lang="en-US" smtClean="0"/>
-              <a:t>9/8/22</a:t>
+              <a:t>9/13/22</a:t>
             </a:fld>
             <a:endParaRPr lang="en-US"/>
           </a:p>
@@ -1013,7 +1451,7 @@
           <a:p>
             <a:fld id="{20206855-7A26-4E46-9559-23EAE08BDA85}" type="datetimeFigureOut">
               <a:rPr lang="en-US" smtClean="0"/>
-              <a:t>9/8/22</a:t>
+              <a:t>9/13/22</a:t>
             </a:fld>
             <a:endParaRPr lang="en-US"/>
           </a:p>
@@ -1245,7 +1683,7 @@
           <a:p>
             <a:fld id="{20206855-7A26-4E46-9559-23EAE08BDA85}" type="datetimeFigureOut">
               <a:rPr lang="en-US" smtClean="0"/>
-              <a:t>9/8/22</a:t>
+              <a:t>9/13/22</a:t>
             </a:fld>
             <a:endParaRPr lang="en-US"/>
           </a:p>
@@ -1612,7 +2050,7 @@
           <a:p>
             <a:fld id="{20206855-7A26-4E46-9559-23EAE08BDA85}" type="datetimeFigureOut">
               <a:rPr lang="en-US" smtClean="0"/>
-              <a:t>9/8/22</a:t>
+              <a:t>9/13/22</a:t>
             </a:fld>
             <a:endParaRPr lang="en-US"/>
           </a:p>
@@ -1730,7 +2168,7 @@
           <a:p>
             <a:fld id="{20206855-7A26-4E46-9559-23EAE08BDA85}" type="datetimeFigureOut">
               <a:rPr lang="en-US" smtClean="0"/>
-              <a:t>9/8/22</a:t>
+              <a:t>9/13/22</a:t>
             </a:fld>
             <a:endParaRPr lang="en-US"/>
           </a:p>
@@ -1825,7 +2263,7 @@
           <a:p>
             <a:fld id="{20206855-7A26-4E46-9559-23EAE08BDA85}" type="datetimeFigureOut">
               <a:rPr lang="en-US" smtClean="0"/>
-              <a:t>9/8/22</a:t>
+              <a:t>9/13/22</a:t>
             </a:fld>
             <a:endParaRPr lang="en-US"/>
           </a:p>
@@ -2102,7 +2540,7 @@
           <a:p>
             <a:fld id="{20206855-7A26-4E46-9559-23EAE08BDA85}" type="datetimeFigureOut">
               <a:rPr lang="en-US" smtClean="0"/>
-              <a:t>9/8/22</a:t>
+              <a:t>9/13/22</a:t>
             </a:fld>
             <a:endParaRPr lang="en-US"/>
           </a:p>
@@ -2355,7 +2793,7 @@
           <a:p>
             <a:fld id="{20206855-7A26-4E46-9559-23EAE08BDA85}" type="datetimeFigureOut">
               <a:rPr lang="en-US" smtClean="0"/>
-              <a:t>9/8/22</a:t>
+              <a:t>9/13/22</a:t>
             </a:fld>
             <a:endParaRPr lang="en-US"/>
           </a:p>
@@ -2568,7 +3006,7 @@
           <a:p>
             <a:fld id="{20206855-7A26-4E46-9559-23EAE08BDA85}" type="datetimeFigureOut">
               <a:rPr lang="en-US" smtClean="0"/>
-              <a:t>9/8/22</a:t>
+              <a:t>9/13/22</a:t>
             </a:fld>
             <a:endParaRPr lang="en-US"/>
           </a:p>
@@ -2996,7 +3434,7 @@
           <a:lstStyle/>
           <a:p>
             <a:r>
-              <a:rPr lang="en-US" dirty="0"/>
+              <a:rPr lang="en-US" b="1" dirty="0"/>
               <a:t>Variant 5 - Liza</a:t>
             </a:r>
           </a:p>
@@ -3121,15 +3559,27 @@
         </p:spPr>
         <p:txBody>
           <a:bodyPr>
-            <a:normAutofit fontScale="90000"/>
+            <a:normAutofit/>
           </a:bodyPr>
           <a:lstStyle/>
           <a:p>
             <a:r>
-              <a:rPr lang="en-US" sz="3200" dirty="0" smtClean="0"/>
+              <a:rPr lang="en-US" sz="2400" b="1" dirty="0" smtClean="0">
+                <a:solidFill>
+                  <a:schemeClr val="accent1">
+                    <a:lumMod val="75000"/>
+                  </a:schemeClr>
+                </a:solidFill>
+              </a:rPr>
               <a:t>Equivalence classes</a:t>
             </a:r>
-            <a:endParaRPr lang="en-US" sz="3200" dirty="0"/>
+            <a:endParaRPr lang="en-US" sz="2400" b="1" dirty="0">
+              <a:solidFill>
+                <a:schemeClr val="accent1">
+                  <a:lumMod val="75000"/>
+                </a:schemeClr>
+              </a:solidFill>
+            </a:endParaRPr>
           </a:p>
         </p:txBody>
       </p:sp>
@@ -3143,7 +3593,7 @@
             <p:ph idx="1"/>
             <p:extLst>
               <p:ext uri="{D42A27DB-BD31-4B8C-83A1-F6EECF244321}">
-                <p14:modId xmlns:p14="http://schemas.microsoft.com/office/powerpoint/2010/main" val="2132542487"/>
+                <p14:modId xmlns:p14="http://schemas.microsoft.com/office/powerpoint/2010/main" val="582498402"/>
               </p:ext>
             </p:extLst>
           </p:nvPr>
@@ -3202,9 +3652,7 @@
                       <a:r>
                         <a:rPr lang="en-US" dirty="0" smtClean="0">
                           <a:solidFill>
-                            <a:schemeClr val="accent5">
-                              <a:lumMod val="75000"/>
-                            </a:schemeClr>
+                            <a:srgbClr val="C00000"/>
                           </a:solidFill>
                           <a:latin typeface="Open Sans" panose="020B0604020202020204" charset="0"/>
                           <a:ea typeface="Open Sans" panose="020B0604020202020204" charset="0"/>
@@ -3368,9 +3816,7 @@
                       <a:r>
                         <a:rPr lang="en-US" dirty="0" smtClean="0">
                           <a:solidFill>
-                            <a:schemeClr val="accent5">
-                              <a:lumMod val="75000"/>
-                            </a:schemeClr>
+                            <a:srgbClr val="C00000"/>
                           </a:solidFill>
                           <a:latin typeface="Open Sans" panose="020B0604020202020204" charset="0"/>
                           <a:ea typeface="Open Sans" panose="020B0604020202020204" charset="0"/>
@@ -3414,7 +3860,7 @@
                     <a:p>
                       <a:r>
                         <a:rPr lang="en-US" dirty="0" smtClean="0"/>
-                        <a:t>$0-4</a:t>
+                        <a:t>$0 - &lt;5</a:t>
                       </a:r>
                       <a:endParaRPr lang="en-US" dirty="0"/>
                     </a:p>
@@ -3596,7 +4042,7 @@
                     <a:lstStyle/>
                     <a:p>
                       <a:r>
-                        <a:rPr lang="en-US" smtClean="0"/>
+                        <a:rPr lang="en-US" dirty="0" smtClean="0"/>
                         <a:t>1200</a:t>
                       </a:r>
                       <a:endParaRPr lang="en-US" dirty="0"/>
@@ -3633,8 +4079,29 @@
           <a:p>
             <a:r>
               <a:rPr lang="en-US" sz="1600" dirty="0" smtClean="0"/>
-              <a:t>Equivalence partitioning and Boundary value analysis A system designed for replenishing mobile phone where min replenishment is 5$ and max replenishment is 1000$. There is no commission if user enters less than 50$. User will pay 1% of replenishment when it is less than 500$. In case the replenishment is equal or bigger than 500$, the user will pay 3% of commission. Build equivalence classes (partitions) based on given information</a:t>
+              <a:t>Equivalence partitioning and Boundary value analysis A system designed for replenishing mobile phone where min replenishment is 5$ and max replenishment is 1000$. There is no commission if user enters less than 50$. User will pay 1% of replenishment when it is less than 500$. In case the replenishment is equal or bigger than 500$, the user will pay 3% of commission. </a:t>
             </a:r>
+            <a:r>
+              <a:rPr lang="en-US" sz="1600" dirty="0" smtClean="0"/>
+              <a:t>User can put only positive </a:t>
+            </a:r>
+            <a:r>
+              <a:rPr lang="en-US" sz="1600" dirty="0" smtClean="0"/>
+              <a:t>integers.</a:t>
+            </a:r>
+            <a:r>
+              <a:rPr lang="en-US" sz="1600" dirty="0" smtClean="0"/>
+              <a:t> numbers. Build </a:t>
+            </a:r>
+            <a:r>
+              <a:rPr lang="en-US" sz="1600" dirty="0" smtClean="0"/>
+              <a:t>equivalence classes (partitions) based on given </a:t>
+            </a:r>
+            <a:r>
+              <a:rPr lang="en-US" sz="1600" dirty="0" smtClean="0"/>
+              <a:t>information. </a:t>
+            </a:r>
+            <a:endParaRPr lang="en-US" sz="1600" dirty="0" smtClean="0"/>
           </a:p>
           <a:p>
             <a:endParaRPr lang="en-US" sz="1600" dirty="0"/>
@@ -3650,7 +4117,7 @@
           <p:nvPr>
             <p:extLst>
               <p:ext uri="{D42A27DB-BD31-4B8C-83A1-F6EECF244321}">
-                <p14:modId xmlns:p14="http://schemas.microsoft.com/office/powerpoint/2010/main" val="1239910090"/>
+                <p14:modId xmlns:p14="http://schemas.microsoft.com/office/powerpoint/2010/main" val="723498953"/>
               </p:ext>
             </p:extLst>
           </p:nvPr>
@@ -3667,21 +4134,21 @@
                 <a:gridCol w="499554">
                   <a:extLst>
                     <a:ext uri="{9D8B030D-6E8A-4147-A177-3AD203B41FA5}">
-                      <a16:colId xmlns="" xmlns:a16="http://schemas.microsoft.com/office/drawing/2014/main" val="20000"/>
+                      <a16:colId xmlns:a16="http://schemas.microsoft.com/office/drawing/2014/main" xmlns="" val="20000"/>
                     </a:ext>
                   </a:extLst>
                 </a:gridCol>
                 <a:gridCol w="3831815">
                   <a:extLst>
                     <a:ext uri="{9D8B030D-6E8A-4147-A177-3AD203B41FA5}">
-                      <a16:colId xmlns="" xmlns:a16="http://schemas.microsoft.com/office/drawing/2014/main" val="20001"/>
+                      <a16:colId xmlns:a16="http://schemas.microsoft.com/office/drawing/2014/main" xmlns="" val="20001"/>
                     </a:ext>
                   </a:extLst>
                 </a:gridCol>
                 <a:gridCol w="6184231">
                   <a:extLst>
                     <a:ext uri="{9D8B030D-6E8A-4147-A177-3AD203B41FA5}">
-                      <a16:colId xmlns="" xmlns:a16="http://schemas.microsoft.com/office/drawing/2014/main" val="20002"/>
+                      <a16:colId xmlns:a16="http://schemas.microsoft.com/office/drawing/2014/main" xmlns="" val="20002"/>
                     </a:ext>
                   </a:extLst>
                 </a:gridCol>
@@ -3875,7 +4342,7 @@
                 </a:tc>
                 <a:extLst>
                   <a:ext uri="{0D108BD9-81ED-4DB2-BD59-A6C34878D82A}">
-                    <a16:rowId xmlns="" xmlns:a16="http://schemas.microsoft.com/office/drawing/2014/main" val="10000"/>
+                    <a16:rowId xmlns:a16="http://schemas.microsoft.com/office/drawing/2014/main" xmlns="" val="10000"/>
                   </a:ext>
                 </a:extLst>
               </a:tr>
@@ -4120,7 +4587,7 @@
                 </a:tc>
                 <a:extLst>
                   <a:ext uri="{0D108BD9-81ED-4DB2-BD59-A6C34878D82A}">
-                    <a16:rowId xmlns="" xmlns:a16="http://schemas.microsoft.com/office/drawing/2014/main" val="10001"/>
+                    <a16:rowId xmlns:a16="http://schemas.microsoft.com/office/drawing/2014/main" xmlns="" val="10001"/>
                   </a:ext>
                 </a:extLst>
               </a:tr>
@@ -4283,7 +4750,7 @@
                           <a:ea typeface="Calibri" charset="0"/>
                           <a:cs typeface="Calibri" charset="0"/>
                         </a:rPr>
-                        <a:t>System allow to make replenishment with no commission</a:t>
+                        <a:t>System allows to make replenishment with no commission</a:t>
                       </a:r>
                       <a:endParaRPr lang="en-US" sz="1800" b="0" i="0" u="none" strike="noStrike" dirty="0">
                         <a:solidFill>
@@ -4337,7 +4804,7 @@
                 </a:tc>
                 <a:extLst>
                   <a:ext uri="{0D108BD9-81ED-4DB2-BD59-A6C34878D82A}">
-                    <a16:rowId xmlns="" xmlns:a16="http://schemas.microsoft.com/office/drawing/2014/main" val="10002"/>
+                    <a16:rowId xmlns:a16="http://schemas.microsoft.com/office/drawing/2014/main" xmlns="" val="10002"/>
                   </a:ext>
                 </a:extLst>
               </a:tr>
@@ -4554,7 +5021,7 @@
                 </a:tc>
                 <a:extLst>
                   <a:ext uri="{0D108BD9-81ED-4DB2-BD59-A6C34878D82A}">
-                    <a16:rowId xmlns="" xmlns:a16="http://schemas.microsoft.com/office/drawing/2014/main" val="10003"/>
+                    <a16:rowId xmlns:a16="http://schemas.microsoft.com/office/drawing/2014/main" xmlns="" val="10003"/>
                   </a:ext>
                 </a:extLst>
               </a:tr>
@@ -4771,7 +5238,7 @@
                 </a:tc>
                 <a:extLst>
                   <a:ext uri="{0D108BD9-81ED-4DB2-BD59-A6C34878D82A}">
-                    <a16:rowId xmlns="" xmlns:a16="http://schemas.microsoft.com/office/drawing/2014/main" val="10004"/>
+                    <a16:rowId xmlns:a16="http://schemas.microsoft.com/office/drawing/2014/main" xmlns="" val="10004"/>
                   </a:ext>
                 </a:extLst>
               </a:tr>
@@ -4980,7 +5447,7 @@
                 </a:tc>
                 <a:extLst>
                   <a:ext uri="{0D108BD9-81ED-4DB2-BD59-A6C34878D82A}">
-                    <a16:rowId xmlns="" xmlns:a16="http://schemas.microsoft.com/office/drawing/2014/main" val="10005"/>
+                    <a16:rowId xmlns:a16="http://schemas.microsoft.com/office/drawing/2014/main" xmlns="" val="10005"/>
                   </a:ext>
                 </a:extLst>
               </a:tr>
@@ -5144,7 +5611,7 @@
                         <a:defRPr/>
                       </a:pPr>
                       <a:r>
-                        <a:rPr lang="en-US" sz="1800" b="0" i="0" u="none" strike="noStrike" smtClean="0">
+                        <a:rPr lang="en-US" sz="1800" b="0" i="0" u="none" strike="noStrike" dirty="0" smtClean="0">
                           <a:solidFill>
                             <a:srgbClr val="000000"/>
                           </a:solidFill>
@@ -5249,15 +5716,27 @@
         </p:spPr>
         <p:txBody>
           <a:bodyPr>
-            <a:normAutofit fontScale="90000"/>
+            <a:normAutofit/>
           </a:bodyPr>
           <a:lstStyle/>
           <a:p>
             <a:r>
-              <a:rPr lang="en-US" sz="3200" dirty="0" smtClean="0"/>
+              <a:rPr lang="en-US" sz="2400" b="1" dirty="0" smtClean="0">
+                <a:solidFill>
+                  <a:schemeClr val="accent1">
+                    <a:lumMod val="75000"/>
+                  </a:schemeClr>
+                </a:solidFill>
+              </a:rPr>
               <a:t>BVA</a:t>
             </a:r>
-            <a:endParaRPr lang="en-US" sz="3200" dirty="0"/>
+            <a:endParaRPr lang="en-US" sz="2400" b="1" dirty="0">
+              <a:solidFill>
+                <a:schemeClr val="accent1">
+                  <a:lumMod val="75000"/>
+                </a:schemeClr>
+              </a:solidFill>
+            </a:endParaRPr>
           </a:p>
         </p:txBody>
       </p:sp>
@@ -5271,7 +5750,7 @@
             <p:ph idx="1"/>
             <p:extLst>
               <p:ext uri="{D42A27DB-BD31-4B8C-83A1-F6EECF244321}">
-                <p14:modId xmlns:p14="http://schemas.microsoft.com/office/powerpoint/2010/main" val="890734013"/>
+                <p14:modId xmlns:p14="http://schemas.microsoft.com/office/powerpoint/2010/main" val="971946439"/>
               </p:ext>
             </p:extLst>
           </p:nvPr>
@@ -5330,9 +5809,7 @@
                       <a:r>
                         <a:rPr lang="en-US" dirty="0" smtClean="0">
                           <a:solidFill>
-                            <a:schemeClr val="accent5">
-                              <a:lumMod val="75000"/>
-                            </a:schemeClr>
+                            <a:srgbClr val="C00000"/>
                           </a:solidFill>
                           <a:latin typeface="Open Sans" panose="020B0604020202020204" charset="0"/>
                           <a:ea typeface="Open Sans" panose="020B0604020202020204" charset="0"/>
@@ -5367,7 +5844,7 @@
                         <a:defRPr/>
                       </a:pPr>
                       <a:r>
-                        <a:rPr lang="en-US" smtClean="0">
+                        <a:rPr lang="en-US" dirty="0" smtClean="0">
                           <a:solidFill>
                             <a:schemeClr val="accent5">
                               <a:lumMod val="75000"/>
@@ -5377,7 +5854,20 @@
                           <a:ea typeface="Open Sans" panose="020B0604020202020204" charset="0"/>
                           <a:cs typeface="Open Sans" panose="020B0604020202020204" charset="0"/>
                         </a:rPr>
-                        <a:t>Valid for 0% commision</a:t>
+                        <a:t>Valid for 0% </a:t>
+                      </a:r>
+                      <a:r>
+                        <a:rPr lang="en-US" dirty="0" err="1" smtClean="0">
+                          <a:solidFill>
+                            <a:schemeClr val="accent5">
+                              <a:lumMod val="75000"/>
+                            </a:schemeClr>
+                          </a:solidFill>
+                          <a:latin typeface="Open Sans" panose="020B0604020202020204" charset="0"/>
+                          <a:ea typeface="Open Sans" panose="020B0604020202020204" charset="0"/>
+                          <a:cs typeface="Open Sans" panose="020B0604020202020204" charset="0"/>
+                        </a:rPr>
+                        <a:t>commision</a:t>
                       </a:r>
                       <a:endParaRPr lang="en-US" dirty="0" smtClean="0">
                         <a:solidFill>
@@ -5496,9 +5986,7 @@
                       <a:r>
                         <a:rPr lang="en-US" dirty="0" smtClean="0">
                           <a:solidFill>
-                            <a:schemeClr val="accent5">
-                              <a:lumMod val="75000"/>
-                            </a:schemeClr>
+                            <a:srgbClr val="C00000"/>
                           </a:solidFill>
                           <a:latin typeface="Open Sans" panose="020B0604020202020204" charset="0"/>
                           <a:ea typeface="Open Sans" panose="020B0604020202020204" charset="0"/>
@@ -5542,7 +6030,7 @@
                     <a:p>
                       <a:r>
                         <a:rPr lang="en-US" dirty="0" smtClean="0"/>
-                        <a:t>$0-4</a:t>
+                        <a:t>$0-&lt;5</a:t>
                       </a:r>
                       <a:endParaRPr lang="en-US" dirty="0"/>
                     </a:p>
@@ -5656,7 +6144,7 @@
                           <a:ea typeface="Open Sans" panose="020B0604020202020204" charset="0"/>
                           <a:cs typeface="Open Sans" panose="020B0604020202020204" charset="0"/>
                         </a:rPr>
-                        <a:t>EP</a:t>
+                        <a:t>BVA</a:t>
                       </a:r>
                     </a:p>
                   </a:txBody>
@@ -5669,7 +6157,11 @@
                     <a:p>
                       <a:r>
                         <a:rPr lang="en-US" dirty="0" smtClean="0"/>
-                        <a:t>0</a:t>
+                        <a:t>0    </a:t>
+                      </a:r>
+                      <a:r>
+                        <a:rPr lang="en-US" dirty="0" smtClean="0"/>
+                        <a:t>    4</a:t>
                       </a:r>
                       <a:endParaRPr lang="en-US" dirty="0"/>
                     </a:p>
@@ -5750,7 +6242,7 @@
           <p:nvPr>
             <p:extLst>
               <p:ext uri="{D42A27DB-BD31-4B8C-83A1-F6EECF244321}">
-                <p14:modId xmlns:p14="http://schemas.microsoft.com/office/powerpoint/2010/main" val="947461070"/>
+                <p14:modId xmlns:p14="http://schemas.microsoft.com/office/powerpoint/2010/main" val="1460178465"/>
               </p:ext>
             </p:extLst>
           </p:nvPr>
@@ -5767,21 +6259,21 @@
                 <a:gridCol w="499554">
                   <a:extLst>
                     <a:ext uri="{9D8B030D-6E8A-4147-A177-3AD203B41FA5}">
-                      <a16:colId xmlns="" xmlns:a16="http://schemas.microsoft.com/office/drawing/2014/main" val="20000"/>
+                      <a16:colId xmlns:a16="http://schemas.microsoft.com/office/drawing/2014/main" xmlns="" val="20000"/>
                     </a:ext>
                   </a:extLst>
                 </a:gridCol>
                 <a:gridCol w="3831815">
                   <a:extLst>
                     <a:ext uri="{9D8B030D-6E8A-4147-A177-3AD203B41FA5}">
-                      <a16:colId xmlns="" xmlns:a16="http://schemas.microsoft.com/office/drawing/2014/main" val="20001"/>
+                      <a16:colId xmlns:a16="http://schemas.microsoft.com/office/drawing/2014/main" xmlns="" val="20001"/>
                     </a:ext>
                   </a:extLst>
                 </a:gridCol>
                 <a:gridCol w="6184231">
                   <a:extLst>
                     <a:ext uri="{9D8B030D-6E8A-4147-A177-3AD203B41FA5}">
-                      <a16:colId xmlns="" xmlns:a16="http://schemas.microsoft.com/office/drawing/2014/main" val="20002"/>
+                      <a16:colId xmlns:a16="http://schemas.microsoft.com/office/drawing/2014/main" xmlns="" val="20002"/>
                     </a:ext>
                   </a:extLst>
                 </a:gridCol>
@@ -5975,7 +6467,7 @@
                 </a:tc>
                 <a:extLst>
                   <a:ext uri="{0D108BD9-81ED-4DB2-BD59-A6C34878D82A}">
-                    <a16:rowId xmlns="" xmlns:a16="http://schemas.microsoft.com/office/drawing/2014/main" val="10000"/>
+                    <a16:rowId xmlns:a16="http://schemas.microsoft.com/office/drawing/2014/main" xmlns="" val="10000"/>
                   </a:ext>
                 </a:extLst>
               </a:tr>
@@ -6220,7 +6712,7 @@
                 </a:tc>
                 <a:extLst>
                   <a:ext uri="{0D108BD9-81ED-4DB2-BD59-A6C34878D82A}">
-                    <a16:rowId xmlns="" xmlns:a16="http://schemas.microsoft.com/office/drawing/2014/main" val="10001"/>
+                    <a16:rowId xmlns:a16="http://schemas.microsoft.com/office/drawing/2014/main" xmlns="" val="10001"/>
                   </a:ext>
                 </a:extLst>
               </a:tr>
@@ -6383,7 +6875,7 @@
                           <a:ea typeface="Calibri" charset="0"/>
                           <a:cs typeface="Calibri" charset="0"/>
                         </a:rPr>
-                        <a:t>System allow to make replenishment with no commission</a:t>
+                        <a:t>System allows to make replenishment with no commission</a:t>
                       </a:r>
                       <a:endParaRPr lang="en-US" sz="1800" b="0" i="0" u="none" strike="noStrike" dirty="0">
                         <a:solidFill>
@@ -6437,7 +6929,7 @@
                 </a:tc>
                 <a:extLst>
                   <a:ext uri="{0D108BD9-81ED-4DB2-BD59-A6C34878D82A}">
-                    <a16:rowId xmlns="" xmlns:a16="http://schemas.microsoft.com/office/drawing/2014/main" val="10002"/>
+                    <a16:rowId xmlns:a16="http://schemas.microsoft.com/office/drawing/2014/main" xmlns="" val="10002"/>
                   </a:ext>
                 </a:extLst>
               </a:tr>
@@ -6617,7 +7109,7 @@
                           <a:ea typeface="Calibri" charset="0"/>
                           <a:cs typeface="Calibri" charset="0"/>
                         </a:rPr>
-                        <a:t>System allow to make replenishment with no commission</a:t>
+                        <a:t>System allows to make replenishment with no commission</a:t>
                       </a:r>
                     </a:p>
                   </a:txBody>
@@ -6874,7 +7366,7 @@
                 </a:tc>
                 <a:extLst>
                   <a:ext uri="{0D108BD9-81ED-4DB2-BD59-A6C34878D82A}">
-                    <a16:rowId xmlns="" xmlns:a16="http://schemas.microsoft.com/office/drawing/2014/main" val="10003"/>
+                    <a16:rowId xmlns:a16="http://schemas.microsoft.com/office/drawing/2014/main" xmlns="" val="10003"/>
                   </a:ext>
                 </a:extLst>
               </a:tr>
@@ -7320,7 +7812,7 @@
                 </a:tc>
                 <a:extLst>
                   <a:ext uri="{0D108BD9-81ED-4DB2-BD59-A6C34878D82A}">
-                    <a16:rowId xmlns="" xmlns:a16="http://schemas.microsoft.com/office/drawing/2014/main" val="10004"/>
+                    <a16:rowId xmlns:a16="http://schemas.microsoft.com/office/drawing/2014/main" xmlns="" val="10004"/>
                   </a:ext>
                 </a:extLst>
               </a:tr>
@@ -7758,7 +8250,7 @@
                 </a:tc>
                 <a:extLst>
                   <a:ext uri="{0D108BD9-81ED-4DB2-BD59-A6C34878D82A}">
-                    <a16:rowId xmlns="" xmlns:a16="http://schemas.microsoft.com/office/drawing/2014/main" val="10005"/>
+                    <a16:rowId xmlns:a16="http://schemas.microsoft.com/office/drawing/2014/main" xmlns="" val="10005"/>
                   </a:ext>
                 </a:extLst>
               </a:tr>
@@ -8011,47 +8503,7 @@
       </p:grpSpPr>
       <p:sp>
         <p:nvSpPr>
-          <p:cNvPr id="3" name="Content Placeholder 2"/>
-          <p:cNvSpPr>
-            <a:spLocks noGrp="1"/>
-          </p:cNvSpPr>
-          <p:nvPr>
-            <p:ph idx="1"/>
-          </p:nvPr>
-        </p:nvSpPr>
-        <p:spPr>
-          <a:xfrm>
-            <a:off x="838200" y="610235"/>
-            <a:ext cx="10515600" cy="1263535"/>
-          </a:xfrm>
-        </p:spPr>
-        <p:txBody>
-          <a:bodyPr>
-            <a:normAutofit/>
-          </a:bodyPr>
-          <a:lstStyle/>
-          <a:p>
-            <a:pPr marL="0" indent="0">
-              <a:buNone/>
-            </a:pPr>
-            <a:r>
-              <a:rPr lang="en-US" sz="1200" dirty="0" smtClean="0"/>
-              <a:t>Decision tables You want to buy travel card of some transport network (works during 1 month). The following types of discount exist: </a:t>
-            </a:r>
-            <a:r>
-              <a:rPr lang="en-US" sz="1200" dirty="0"/>
-              <a:t>F</a:t>
-            </a:r>
-            <a:r>
-              <a:rPr lang="en-US" sz="1200" dirty="0" smtClean="0"/>
-              <a:t>or Student – gives you 20% discount if you are student; Pensioner– gives you 10% discount, available if you are 60 years old and more (cannot be used with Student discount) You can get additional 5% discount if you are buying such travel cards during the last 6 months in a row.</a:t>
-            </a:r>
-          </a:p>
-        </p:txBody>
-      </p:sp>
-      <p:sp>
-        <p:nvSpPr>
-          <p:cNvPr id="4" name="Title 1"/>
+          <p:cNvPr id="4" name="Title 2"/>
           <p:cNvSpPr>
             <a:spLocks noGrp="1"/>
           </p:cNvSpPr>
@@ -8061,743 +8513,47 @@
         </p:nvSpPr>
         <p:spPr>
           <a:xfrm>
-            <a:off x="838200" y="159084"/>
-            <a:ext cx="10515600" cy="451151"/>
+            <a:off x="838200" y="0"/>
+            <a:ext cx="10820400" cy="685800"/>
           </a:xfrm>
         </p:spPr>
         <p:txBody>
           <a:bodyPr>
-            <a:normAutofit fontScale="90000"/>
+            <a:normAutofit/>
           </a:bodyPr>
           <a:lstStyle/>
           <a:p>
             <a:r>
-              <a:rPr lang="en-US" sz="3200" dirty="0" smtClean="0"/>
-              <a:t>Decision table</a:t>
+              <a:rPr lang="en-US" sz="2400" b="1" dirty="0">
+                <a:solidFill>
+                  <a:schemeClr val="accent1">
+                    <a:lumMod val="75000"/>
+                  </a:schemeClr>
+                </a:solidFill>
+              </a:rPr>
+              <a:t>EP and BVA: Test Items</a:t>
             </a:r>
-            <a:endParaRPr lang="en-US" sz="3200" dirty="0"/>
           </a:p>
         </p:txBody>
       </p:sp>
       <p:graphicFrame>
         <p:nvGraphicFramePr>
-          <p:cNvPr id="7" name="Table 6"/>
+          <p:cNvPr id="6" name="Content Placeholder 3"/>
           <p:cNvGraphicFramePr>
             <a:graphicFrameLocks noGrp="1"/>
           </p:cNvGraphicFramePr>
           <p:nvPr>
+            <p:ph idx="1"/>
             <p:extLst>
               <p:ext uri="{D42A27DB-BD31-4B8C-83A1-F6EECF244321}">
-                <p14:modId xmlns:p14="http://schemas.microsoft.com/office/powerpoint/2010/main" val="551177668"/>
+                <p14:modId xmlns:p14="http://schemas.microsoft.com/office/powerpoint/2010/main" val="818064359"/>
               </p:ext>
             </p:extLst>
           </p:nvPr>
         </p:nvGraphicFramePr>
         <p:xfrm>
-          <a:off x="838200" y="1242002"/>
-          <a:ext cx="7919432" cy="2180310"/>
-        </p:xfrm>
-        <a:graphic>
-          <a:graphicData uri="http://schemas.openxmlformats.org/drawingml/2006/table">
-            <a:tbl>
-              <a:tblPr firstRow="1" bandRow="1">
-                <a:tableStyleId>{93296810-A885-4BE3-A3E7-6D5BEEA58F35}</a:tableStyleId>
-              </a:tblPr>
-              <a:tblGrid>
-                <a:gridCol w="2074064"/>
-                <a:gridCol w="818261"/>
-                <a:gridCol w="844383"/>
-                <a:gridCol w="1045681"/>
-                <a:gridCol w="1045681"/>
-                <a:gridCol w="1045681"/>
-                <a:gridCol w="1045681"/>
-              </a:tblGrid>
-              <a:tr h="283157">
-                <a:tc>
-                  <a:txBody>
-                    <a:bodyPr/>
-                    <a:lstStyle/>
-                    <a:p>
-                      <a:r>
-                        <a:rPr lang="en-US" sz="1300" dirty="0" smtClean="0"/>
-                        <a:t>Causes (</a:t>
-                      </a:r>
-                      <a:r>
-                        <a:rPr lang="en-US" sz="1300" dirty="0" smtClean="0"/>
-                        <a:t>inputs)</a:t>
-                      </a:r>
-                      <a:endParaRPr lang="en-US" sz="1300" dirty="0"/>
-                    </a:p>
-                  </a:txBody>
-                  <a:tcPr marL="84947" marR="84947" marT="42474" marB="42474"/>
-                </a:tc>
-                <a:tc>
-                  <a:txBody>
-                    <a:bodyPr/>
-                    <a:lstStyle/>
-                    <a:p>
-                      <a:r>
-                        <a:rPr lang="en-US" sz="1300" dirty="0" smtClean="0"/>
-                        <a:t>R1/R3</a:t>
-                      </a:r>
-                      <a:endParaRPr lang="en-US" sz="1300" dirty="0"/>
-                    </a:p>
-                  </a:txBody>
-                  <a:tcPr marL="84947" marR="84947" marT="42474" marB="42474"/>
-                </a:tc>
-                <a:tc>
-                  <a:txBody>
-                    <a:bodyPr/>
-                    <a:lstStyle/>
-                    <a:p>
-                      <a:r>
-                        <a:rPr lang="en-US" sz="1300" dirty="0" smtClean="0"/>
-                        <a:t>R2/R4</a:t>
-                      </a:r>
-                      <a:endParaRPr lang="en-US" sz="1300" dirty="0"/>
-                    </a:p>
-                  </a:txBody>
-                  <a:tcPr marL="84947" marR="84947" marT="42474" marB="42474"/>
-                </a:tc>
-                <a:tc>
-                  <a:txBody>
-                    <a:bodyPr/>
-                    <a:lstStyle/>
-                    <a:p>
-                      <a:r>
-                        <a:rPr lang="en-US" sz="1300" dirty="0" smtClean="0"/>
-                        <a:t>R5</a:t>
-                      </a:r>
-                      <a:endParaRPr lang="en-US" sz="1300" dirty="0"/>
-                    </a:p>
-                  </a:txBody>
-                  <a:tcPr marL="84947" marR="84947" marT="42474" marB="42474"/>
-                </a:tc>
-                <a:tc>
-                  <a:txBody>
-                    <a:bodyPr/>
-                    <a:lstStyle/>
-                    <a:p>
-                      <a:r>
-                        <a:rPr lang="en-US" sz="1300" dirty="0" smtClean="0"/>
-                        <a:t>R6</a:t>
-                      </a:r>
-                      <a:endParaRPr lang="en-US" sz="1300" dirty="0"/>
-                    </a:p>
-                  </a:txBody>
-                  <a:tcPr marL="84947" marR="84947" marT="42474" marB="42474"/>
-                </a:tc>
-                <a:tc>
-                  <a:txBody>
-                    <a:bodyPr/>
-                    <a:lstStyle/>
-                    <a:p>
-                      <a:r>
-                        <a:rPr lang="en-US" sz="1300" dirty="0" smtClean="0"/>
-                        <a:t>R7</a:t>
-                      </a:r>
-                      <a:endParaRPr lang="en-US" sz="1300" dirty="0"/>
-                    </a:p>
-                  </a:txBody>
-                  <a:tcPr marL="84947" marR="84947" marT="42474" marB="42474"/>
-                </a:tc>
-                <a:tc>
-                  <a:txBody>
-                    <a:bodyPr/>
-                    <a:lstStyle/>
-                    <a:p>
-                      <a:r>
-                        <a:rPr lang="en-US" sz="1300" dirty="0" smtClean="0"/>
-                        <a:t>R8</a:t>
-                      </a:r>
-                      <a:endParaRPr lang="en-US" sz="1300" dirty="0"/>
-                    </a:p>
-                  </a:txBody>
-                  <a:tcPr marL="84947" marR="84947" marT="42474" marB="42474"/>
-                </a:tc>
-              </a:tr>
-              <a:tr h="283157">
-                <a:tc>
-                  <a:txBody>
-                    <a:bodyPr/>
-                    <a:lstStyle/>
-                    <a:p>
-                      <a:r>
-                        <a:rPr lang="en-US" sz="1300" dirty="0" smtClean="0"/>
-                        <a:t>For Student</a:t>
-                      </a:r>
-                      <a:endParaRPr lang="en-US" sz="1300" dirty="0"/>
-                    </a:p>
-                  </a:txBody>
-                  <a:tcPr marL="84947" marR="84947" marT="42474" marB="42474"/>
-                </a:tc>
-                <a:tc>
-                  <a:txBody>
-                    <a:bodyPr/>
-                    <a:lstStyle/>
-                    <a:p>
-                      <a:r>
-                        <a:rPr lang="en-US" sz="1300" dirty="0" smtClean="0"/>
-                        <a:t>Y</a:t>
-                      </a:r>
-                      <a:endParaRPr lang="en-US" sz="1300" dirty="0"/>
-                    </a:p>
-                  </a:txBody>
-                  <a:tcPr marL="84947" marR="84947" marT="42474" marB="42474"/>
-                </a:tc>
-                <a:tc>
-                  <a:txBody>
-                    <a:bodyPr/>
-                    <a:lstStyle/>
-                    <a:p>
-                      <a:r>
-                        <a:rPr lang="en-US" sz="1300" dirty="0" smtClean="0"/>
-                        <a:t>Y</a:t>
-                      </a:r>
-                      <a:endParaRPr lang="en-US" sz="1300" dirty="0"/>
-                    </a:p>
-                  </a:txBody>
-                  <a:tcPr marL="84947" marR="84947" marT="42474" marB="42474"/>
-                </a:tc>
-                <a:tc>
-                  <a:txBody>
-                    <a:bodyPr/>
-                    <a:lstStyle/>
-                    <a:p>
-                      <a:r>
-                        <a:rPr lang="en-US" sz="1300" dirty="0" smtClean="0"/>
-                        <a:t>N</a:t>
-                      </a:r>
-                      <a:endParaRPr lang="en-US" sz="1300" dirty="0"/>
-                    </a:p>
-                  </a:txBody>
-                  <a:tcPr marL="84947" marR="84947" marT="42474" marB="42474"/>
-                </a:tc>
-                <a:tc>
-                  <a:txBody>
-                    <a:bodyPr/>
-                    <a:lstStyle/>
-                    <a:p>
-                      <a:r>
-                        <a:rPr lang="en-US" sz="1300" dirty="0" smtClean="0"/>
-                        <a:t>N</a:t>
-                      </a:r>
-                      <a:endParaRPr lang="en-US" sz="1300" dirty="0"/>
-                    </a:p>
-                  </a:txBody>
-                  <a:tcPr marL="84947" marR="84947" marT="42474" marB="42474"/>
-                </a:tc>
-                <a:tc>
-                  <a:txBody>
-                    <a:bodyPr/>
-                    <a:lstStyle/>
-                    <a:p>
-                      <a:r>
-                        <a:rPr lang="en-US" sz="1300" dirty="0" smtClean="0"/>
-                        <a:t>N</a:t>
-                      </a:r>
-                      <a:endParaRPr lang="en-US" sz="1300" dirty="0"/>
-                    </a:p>
-                  </a:txBody>
-                  <a:tcPr marL="84947" marR="84947" marT="42474" marB="42474"/>
-                </a:tc>
-                <a:tc>
-                  <a:txBody>
-                    <a:bodyPr/>
-                    <a:lstStyle/>
-                    <a:p>
-                      <a:r>
-                        <a:rPr lang="en-US" sz="1300" dirty="0" smtClean="0"/>
-                        <a:t>N</a:t>
-                      </a:r>
-                      <a:endParaRPr lang="en-US" sz="1300" dirty="0"/>
-                    </a:p>
-                  </a:txBody>
-                  <a:tcPr marL="84947" marR="84947" marT="42474" marB="42474"/>
-                </a:tc>
-              </a:tr>
-              <a:tr h="283157">
-                <a:tc>
-                  <a:txBody>
-                    <a:bodyPr/>
-                    <a:lstStyle/>
-                    <a:p>
-                      <a:r>
-                        <a:rPr lang="en-US" sz="1300" dirty="0" smtClean="0"/>
-                        <a:t>Pensioner over 60s</a:t>
-                      </a:r>
-                      <a:endParaRPr lang="en-US" sz="1300" dirty="0"/>
-                    </a:p>
-                  </a:txBody>
-                  <a:tcPr marL="84947" marR="84947" marT="42474" marB="42474"/>
-                </a:tc>
-                <a:tc>
-                  <a:txBody>
-                    <a:bodyPr/>
-                    <a:lstStyle/>
-                    <a:p>
-                      <a:r>
-                        <a:rPr lang="en-US" sz="1300" dirty="0" smtClean="0"/>
-                        <a:t>Y/N</a:t>
-                      </a:r>
-                      <a:endParaRPr lang="en-US" sz="1300" dirty="0"/>
-                    </a:p>
-                  </a:txBody>
-                  <a:tcPr marL="84947" marR="84947" marT="42474" marB="42474"/>
-                </a:tc>
-                <a:tc>
-                  <a:txBody>
-                    <a:bodyPr/>
-                    <a:lstStyle/>
-                    <a:p>
-                      <a:r>
-                        <a:rPr lang="en-US" sz="1300" dirty="0" smtClean="0"/>
-                        <a:t>Y/N</a:t>
-                      </a:r>
-                      <a:endParaRPr lang="en-US" sz="1300" dirty="0"/>
-                    </a:p>
-                  </a:txBody>
-                  <a:tcPr marL="84947" marR="84947" marT="42474" marB="42474"/>
-                </a:tc>
-                <a:tc>
-                  <a:txBody>
-                    <a:bodyPr/>
-                    <a:lstStyle/>
-                    <a:p>
-                      <a:r>
-                        <a:rPr lang="en-US" sz="1300" dirty="0" smtClean="0"/>
-                        <a:t>Y</a:t>
-                      </a:r>
-                      <a:endParaRPr lang="en-US" sz="1300" dirty="0"/>
-                    </a:p>
-                  </a:txBody>
-                  <a:tcPr marL="84947" marR="84947" marT="42474" marB="42474"/>
-                </a:tc>
-                <a:tc>
-                  <a:txBody>
-                    <a:bodyPr/>
-                    <a:lstStyle/>
-                    <a:p>
-                      <a:r>
-                        <a:rPr lang="en-US" sz="1300" dirty="0" smtClean="0"/>
-                        <a:t>Y</a:t>
-                      </a:r>
-                      <a:endParaRPr lang="en-US" sz="1300" dirty="0"/>
-                    </a:p>
-                  </a:txBody>
-                  <a:tcPr marL="84947" marR="84947" marT="42474" marB="42474"/>
-                </a:tc>
-                <a:tc>
-                  <a:txBody>
-                    <a:bodyPr/>
-                    <a:lstStyle/>
-                    <a:p>
-                      <a:r>
-                        <a:rPr lang="en-US" sz="1300" dirty="0" smtClean="0"/>
-                        <a:t>N</a:t>
-                      </a:r>
-                      <a:endParaRPr lang="en-US" sz="1300" dirty="0"/>
-                    </a:p>
-                  </a:txBody>
-                  <a:tcPr marL="84947" marR="84947" marT="42474" marB="42474"/>
-                </a:tc>
-                <a:tc>
-                  <a:txBody>
-                    <a:bodyPr/>
-                    <a:lstStyle/>
-                    <a:p>
-                      <a:r>
-                        <a:rPr lang="en-US" sz="1300" dirty="0" smtClean="0"/>
-                        <a:t>N</a:t>
-                      </a:r>
-                      <a:endParaRPr lang="en-US" sz="1300" dirty="0"/>
-                    </a:p>
-                  </a:txBody>
-                  <a:tcPr marL="84947" marR="84947" marT="42474" marB="42474"/>
-                </a:tc>
-              </a:tr>
-              <a:tr h="481368">
-                <a:tc>
-                  <a:txBody>
-                    <a:bodyPr/>
-                    <a:lstStyle/>
-                    <a:p>
-                      <a:r>
-                        <a:rPr lang="en-US" sz="1300" baseline="0" dirty="0" smtClean="0"/>
-                        <a:t>Multiply buying card during 6 month </a:t>
-                      </a:r>
-                      <a:endParaRPr lang="en-US" sz="1300" dirty="0"/>
-                    </a:p>
-                  </a:txBody>
-                  <a:tcPr marL="84947" marR="84947" marT="42474" marB="42474"/>
-                </a:tc>
-                <a:tc>
-                  <a:txBody>
-                    <a:bodyPr/>
-                    <a:lstStyle/>
-                    <a:p>
-                      <a:r>
-                        <a:rPr lang="en-US" sz="1300" dirty="0" smtClean="0"/>
-                        <a:t>Y</a:t>
-                      </a:r>
-                      <a:endParaRPr lang="en-US" sz="1300" dirty="0"/>
-                    </a:p>
-                  </a:txBody>
-                  <a:tcPr marL="84947" marR="84947" marT="42474" marB="42474"/>
-                </a:tc>
-                <a:tc>
-                  <a:txBody>
-                    <a:bodyPr/>
-                    <a:lstStyle/>
-                    <a:p>
-                      <a:r>
-                        <a:rPr lang="en-US" sz="1300" dirty="0" smtClean="0"/>
-                        <a:t>N</a:t>
-                      </a:r>
-                      <a:endParaRPr lang="en-US" sz="1300" dirty="0"/>
-                    </a:p>
-                  </a:txBody>
-                  <a:tcPr marL="84947" marR="84947" marT="42474" marB="42474"/>
-                </a:tc>
-                <a:tc>
-                  <a:txBody>
-                    <a:bodyPr/>
-                    <a:lstStyle/>
-                    <a:p>
-                      <a:r>
-                        <a:rPr lang="en-US" sz="1300" dirty="0" smtClean="0"/>
-                        <a:t>Y</a:t>
-                      </a:r>
-                      <a:endParaRPr lang="en-US" sz="1300" dirty="0"/>
-                    </a:p>
-                  </a:txBody>
-                  <a:tcPr marL="84947" marR="84947" marT="42474" marB="42474"/>
-                </a:tc>
-                <a:tc>
-                  <a:txBody>
-                    <a:bodyPr/>
-                    <a:lstStyle/>
-                    <a:p>
-                      <a:r>
-                        <a:rPr lang="en-US" sz="1300" dirty="0" smtClean="0"/>
-                        <a:t>N</a:t>
-                      </a:r>
-                      <a:endParaRPr lang="en-US" sz="1300" dirty="0"/>
-                    </a:p>
-                  </a:txBody>
-                  <a:tcPr marL="84947" marR="84947" marT="42474" marB="42474"/>
-                </a:tc>
-                <a:tc>
-                  <a:txBody>
-                    <a:bodyPr/>
-                    <a:lstStyle/>
-                    <a:p>
-                      <a:r>
-                        <a:rPr lang="en-US" sz="1300" dirty="0" smtClean="0"/>
-                        <a:t>Y</a:t>
-                      </a:r>
-                      <a:endParaRPr lang="en-US" sz="1300" dirty="0"/>
-                    </a:p>
-                  </a:txBody>
-                  <a:tcPr marL="84947" marR="84947" marT="42474" marB="42474"/>
-                </a:tc>
-                <a:tc>
-                  <a:txBody>
-                    <a:bodyPr/>
-                    <a:lstStyle/>
-                    <a:p>
-                      <a:r>
-                        <a:rPr lang="en-US" sz="1300" dirty="0" smtClean="0"/>
-                        <a:t>N</a:t>
-                      </a:r>
-                      <a:endParaRPr lang="en-US" sz="1300" dirty="0"/>
-                    </a:p>
-                  </a:txBody>
-                  <a:tcPr marL="84947" marR="84947" marT="42474" marB="42474"/>
-                </a:tc>
-              </a:tr>
-              <a:tr h="283157">
-                <a:tc gridSpan="7">
-                  <a:txBody>
-                    <a:bodyPr/>
-                    <a:lstStyle/>
-                    <a:p>
-                      <a:pPr algn="ctr"/>
-                      <a:r>
-                        <a:rPr lang="en-US" sz="1300" dirty="0" smtClean="0"/>
-                        <a:t>Effects (outputs)</a:t>
-                      </a:r>
-                      <a:endParaRPr lang="en-US" sz="1300" dirty="0"/>
-                    </a:p>
-                  </a:txBody>
-                  <a:tcPr marL="84947" marR="84947" marT="42474" marB="42474"/>
-                </a:tc>
-                <a:tc hMerge="1">
-                  <a:txBody>
-                    <a:bodyPr/>
-                    <a:lstStyle/>
-                    <a:p>
-                      <a:endParaRPr lang="en-US"/>
-                    </a:p>
-                  </a:txBody>
-                  <a:tcPr/>
-                </a:tc>
-                <a:tc hMerge="1">
-                  <a:txBody>
-                    <a:bodyPr/>
-                    <a:lstStyle/>
-                    <a:p>
-                      <a:endParaRPr lang="en-US"/>
-                    </a:p>
-                  </a:txBody>
-                  <a:tcPr/>
-                </a:tc>
-                <a:tc hMerge="1">
-                  <a:txBody>
-                    <a:bodyPr/>
-                    <a:lstStyle/>
-                    <a:p>
-                      <a:endParaRPr lang="en-US"/>
-                    </a:p>
-                  </a:txBody>
-                  <a:tcPr/>
-                </a:tc>
-                <a:tc hMerge="1">
-                  <a:txBody>
-                    <a:bodyPr/>
-                    <a:lstStyle/>
-                    <a:p>
-                      <a:endParaRPr lang="en-US"/>
-                    </a:p>
-                  </a:txBody>
-                  <a:tcPr/>
-                </a:tc>
-                <a:tc hMerge="1">
-                  <a:txBody>
-                    <a:bodyPr/>
-                    <a:lstStyle/>
-                    <a:p>
-                      <a:endParaRPr lang="en-US"/>
-                    </a:p>
-                  </a:txBody>
-                  <a:tcPr/>
-                </a:tc>
-                <a:tc hMerge="1">
-                  <a:txBody>
-                    <a:bodyPr/>
-                    <a:lstStyle/>
-                    <a:p>
-                      <a:endParaRPr lang="en-US" dirty="0"/>
-                    </a:p>
-                  </a:txBody>
-                  <a:tcPr/>
-                </a:tc>
-              </a:tr>
-              <a:tr h="283157">
-                <a:tc>
-                  <a:txBody>
-                    <a:bodyPr/>
-                    <a:lstStyle/>
-                    <a:p>
-                      <a:r>
-                        <a:rPr lang="en-US" sz="1300" dirty="0" smtClean="0"/>
-                        <a:t>Discount</a:t>
-                      </a:r>
-                      <a:endParaRPr lang="en-US" sz="1300" dirty="0"/>
-                    </a:p>
-                  </a:txBody>
-                  <a:tcPr marL="84947" marR="84947" marT="42474" marB="42474"/>
-                </a:tc>
-                <a:tc>
-                  <a:txBody>
-                    <a:bodyPr/>
-                    <a:lstStyle/>
-                    <a:p>
-                      <a:r>
-                        <a:rPr lang="en-US" sz="1300" dirty="0" smtClean="0"/>
-                        <a:t>25</a:t>
-                      </a:r>
-                      <a:endParaRPr lang="en-US" sz="1300" dirty="0"/>
-                    </a:p>
-                  </a:txBody>
-                  <a:tcPr marL="84947" marR="84947" marT="42474" marB="42474"/>
-                </a:tc>
-                <a:tc>
-                  <a:txBody>
-                    <a:bodyPr/>
-                    <a:lstStyle/>
-                    <a:p>
-                      <a:r>
-                        <a:rPr lang="en-US" sz="1300" dirty="0" smtClean="0"/>
-                        <a:t>20</a:t>
-                      </a:r>
-                      <a:endParaRPr lang="en-US" sz="1300" dirty="0"/>
-                    </a:p>
-                  </a:txBody>
-                  <a:tcPr marL="84947" marR="84947" marT="42474" marB="42474"/>
-                </a:tc>
-                <a:tc>
-                  <a:txBody>
-                    <a:bodyPr/>
-                    <a:lstStyle/>
-                    <a:p>
-                      <a:r>
-                        <a:rPr lang="en-US" sz="1300" dirty="0" smtClean="0"/>
-                        <a:t>15</a:t>
-                      </a:r>
-                      <a:endParaRPr lang="en-US" sz="1300" dirty="0"/>
-                    </a:p>
-                  </a:txBody>
-                  <a:tcPr marL="84947" marR="84947" marT="42474" marB="42474"/>
-                </a:tc>
-                <a:tc>
-                  <a:txBody>
-                    <a:bodyPr/>
-                    <a:lstStyle/>
-                    <a:p>
-                      <a:r>
-                        <a:rPr lang="en-US" sz="1300" dirty="0" smtClean="0"/>
-                        <a:t>10</a:t>
-                      </a:r>
-                      <a:endParaRPr lang="en-US" sz="1300" dirty="0"/>
-                    </a:p>
-                  </a:txBody>
-                  <a:tcPr marL="84947" marR="84947" marT="42474" marB="42474"/>
-                </a:tc>
-                <a:tc>
-                  <a:txBody>
-                    <a:bodyPr/>
-                    <a:lstStyle/>
-                    <a:p>
-                      <a:r>
-                        <a:rPr lang="en-US" sz="1300" dirty="0" smtClean="0"/>
-                        <a:t>5</a:t>
-                      </a:r>
-                      <a:endParaRPr lang="en-US" sz="1300" dirty="0"/>
-                    </a:p>
-                  </a:txBody>
-                  <a:tcPr marL="84947" marR="84947" marT="42474" marB="42474"/>
-                </a:tc>
-                <a:tc>
-                  <a:txBody>
-                    <a:bodyPr/>
-                    <a:lstStyle/>
-                    <a:p>
-                      <a:r>
-                        <a:rPr lang="en-US" sz="1300" dirty="0" smtClean="0"/>
-                        <a:t>0</a:t>
-                      </a:r>
-                      <a:endParaRPr lang="en-US" sz="1300" dirty="0"/>
-                    </a:p>
-                  </a:txBody>
-                  <a:tcPr marL="84947" marR="84947" marT="42474" marB="42474"/>
-                </a:tc>
-              </a:tr>
-              <a:tr h="283157">
-                <a:tc>
-                  <a:txBody>
-                    <a:bodyPr/>
-                    <a:lstStyle/>
-                    <a:p>
-                      <a:r>
-                        <a:rPr lang="en-US" sz="1300" dirty="0" smtClean="0"/>
-                        <a:t>Message*</a:t>
-                      </a:r>
-                      <a:endParaRPr lang="en-US" sz="1300" dirty="0"/>
-                    </a:p>
-                  </a:txBody>
-                  <a:tcPr marL="84947" marR="84947" marT="42474" marB="42474"/>
-                </a:tc>
-                <a:tc>
-                  <a:txBody>
-                    <a:bodyPr/>
-                    <a:lstStyle/>
-                    <a:p>
-                      <a:r>
-                        <a:rPr lang="en-US" sz="1300" dirty="0" smtClean="0"/>
-                        <a:t>+ </a:t>
-                      </a:r>
-                      <a:endParaRPr lang="en-US" sz="1300" dirty="0"/>
-                    </a:p>
-                  </a:txBody>
-                  <a:tcPr marL="84947" marR="84947" marT="42474" marB="42474"/>
-                </a:tc>
-                <a:tc>
-                  <a:txBody>
-                    <a:bodyPr/>
-                    <a:lstStyle/>
-                    <a:p>
-                      <a:r>
-                        <a:rPr lang="en-US" sz="1300" dirty="0" smtClean="0"/>
-                        <a:t>+</a:t>
-                      </a:r>
-                      <a:endParaRPr lang="en-US" sz="1300" dirty="0"/>
-                    </a:p>
-                  </a:txBody>
-                  <a:tcPr marL="84947" marR="84947" marT="42474" marB="42474"/>
-                </a:tc>
-                <a:tc>
-                  <a:txBody>
-                    <a:bodyPr/>
-                    <a:lstStyle/>
-                    <a:p>
-                      <a:endParaRPr lang="en-US" sz="1300" dirty="0"/>
-                    </a:p>
-                  </a:txBody>
-                  <a:tcPr marL="84947" marR="84947" marT="42474" marB="42474"/>
-                </a:tc>
-                <a:tc>
-                  <a:txBody>
-                    <a:bodyPr/>
-                    <a:lstStyle/>
-                    <a:p>
-                      <a:endParaRPr lang="en-US" sz="1300"/>
-                    </a:p>
-                  </a:txBody>
-                  <a:tcPr marL="84947" marR="84947" marT="42474" marB="42474"/>
-                </a:tc>
-                <a:tc>
-                  <a:txBody>
-                    <a:bodyPr/>
-                    <a:lstStyle/>
-                    <a:p>
-                      <a:endParaRPr lang="en-US" sz="1300" dirty="0"/>
-                    </a:p>
-                  </a:txBody>
-                  <a:tcPr marL="84947" marR="84947" marT="42474" marB="42474"/>
-                </a:tc>
-                <a:tc>
-                  <a:txBody>
-                    <a:bodyPr/>
-                    <a:lstStyle/>
-                    <a:p>
-                      <a:endParaRPr lang="en-US" sz="1300" dirty="0"/>
-                    </a:p>
-                  </a:txBody>
-                  <a:tcPr marL="84947" marR="84947" marT="42474" marB="42474"/>
-                </a:tc>
-              </a:tr>
-            </a:tbl>
-          </a:graphicData>
-        </a:graphic>
-      </p:graphicFrame>
-      <p:graphicFrame>
-        <p:nvGraphicFramePr>
-          <p:cNvPr id="9" name="Table 8"/>
-          <p:cNvGraphicFramePr>
-            <a:graphicFrameLocks noGrp="1"/>
-          </p:cNvGraphicFramePr>
-          <p:nvPr>
-            <p:extLst>
-              <p:ext uri="{D42A27DB-BD31-4B8C-83A1-F6EECF244321}">
-                <p14:modId xmlns:p14="http://schemas.microsoft.com/office/powerpoint/2010/main" val="303781174"/>
-              </p:ext>
-            </p:extLst>
-          </p:nvPr>
-        </p:nvGraphicFramePr>
-        <p:xfrm>
-          <a:off x="838201" y="3527573"/>
-          <a:ext cx="9874386" cy="3098607"/>
+          <a:off x="838200" y="530549"/>
+          <a:ext cx="9945857" cy="6071205"/>
         </p:xfrm>
         <a:graphic>
           <a:graphicData uri="http://schemas.openxmlformats.org/drawingml/2006/table">
@@ -8806,156 +8562,24 @@
                 <a:tableStyleId>{5C22544A-7EE6-4342-B048-85BDC9FD1C3A}</a:tableStyleId>
               </a:tblPr>
               <a:tblGrid>
-                <a:gridCol w="358916"/>
-                <a:gridCol w="3920659"/>
-                <a:gridCol w="5594811"/>
+                <a:gridCol w="1704896"/>
+                <a:gridCol w="3840266"/>
+                <a:gridCol w="4400695"/>
               </a:tblGrid>
-              <a:tr h="349139">
-                <a:tc>
-                  <a:txBody>
-                    <a:bodyPr/>
-                    <a:lstStyle/>
-                    <a:p>
-                      <a:r>
-                        <a:rPr lang="en-US" sz="1700" dirty="0" smtClean="0"/>
+              <a:tr h="350805">
+                <a:tc>
+                  <a:txBody>
+                    <a:bodyPr/>
+                    <a:lstStyle/>
+                    <a:p>
+                      <a:r>
+                        <a:rPr lang="en-US" sz="1700" smtClean="0"/>
                         <a:t>#</a:t>
                       </a:r>
                       <a:endParaRPr lang="en-US" sz="1700" dirty="0"/>
                     </a:p>
                   </a:txBody>
-                  <a:tcPr marL="87285" marR="87285" marT="43642" marB="43642"/>
-                </a:tc>
-                <a:tc>
-                  <a:txBody>
-                    <a:bodyPr/>
-                    <a:lstStyle/>
-                    <a:p>
-                      <a:r>
-                        <a:rPr lang="en-US" sz="1700" dirty="0" smtClean="0"/>
-                        <a:t>Decision</a:t>
-                      </a:r>
-                      <a:endParaRPr lang="en-US" sz="1700" dirty="0"/>
-                    </a:p>
-                  </a:txBody>
-                  <a:tcPr marL="87285" marR="87285" marT="43642" marB="43642"/>
-                </a:tc>
-                <a:tc>
-                  <a:txBody>
-                    <a:bodyPr/>
-                    <a:lstStyle/>
-                    <a:p>
-                      <a:r>
-                        <a:rPr lang="en-US" sz="1700" dirty="0" smtClean="0"/>
-                        <a:t>Outcome</a:t>
-                      </a:r>
-                      <a:endParaRPr lang="en-US" sz="1700" dirty="0"/>
-                    </a:p>
-                  </a:txBody>
-                  <a:tcPr marL="87285" marR="87285" marT="43642" marB="43642"/>
-                </a:tc>
-              </a:tr>
-              <a:tr h="698278">
-                <a:tc>
-                  <a:txBody>
-                    <a:bodyPr/>
-                    <a:lstStyle/>
-                    <a:p>
-                      <a:r>
-                        <a:rPr lang="en-US" sz="1300" dirty="0" smtClean="0"/>
-                        <a:t>1</a:t>
-                      </a:r>
-                      <a:endParaRPr lang="en-US" sz="1300" dirty="0"/>
-                    </a:p>
-                  </a:txBody>
-                  <a:tcPr marL="87285" marR="87285" marT="43642" marB="43642"/>
-                </a:tc>
-                <a:tc>
-                  <a:txBody>
-                    <a:bodyPr/>
-                    <a:lstStyle/>
-                    <a:p>
-                      <a:r>
-                        <a:rPr lang="en-US" sz="1300" dirty="0" smtClean="0"/>
-                        <a:t>If a</a:t>
-                      </a:r>
-                      <a:r>
-                        <a:rPr lang="en-US" sz="1300" baseline="0" dirty="0" smtClean="0"/>
-                        <a:t> </a:t>
-                      </a:r>
-                      <a:r>
-                        <a:rPr lang="en-US" sz="1300" baseline="0" dirty="0" smtClean="0"/>
-                        <a:t>person is a student and pensioner (or not pensioner</a:t>
-                      </a:r>
-                      <a:r>
-                        <a:rPr lang="en-US" sz="1300" baseline="0" dirty="0" smtClean="0"/>
-                        <a:t>) </a:t>
-                      </a:r>
-                      <a:r>
-                        <a:rPr lang="en-US" sz="1300" baseline="0" dirty="0" smtClean="0"/>
-                        <a:t>and buying card again during  6 </a:t>
-                      </a:r>
-                      <a:r>
-                        <a:rPr lang="en-US" sz="1300" baseline="0" dirty="0" smtClean="0"/>
-                        <a:t>month. He chooses more </a:t>
-                      </a:r>
-                      <a:r>
-                        <a:rPr lang="en-US" sz="1300" dirty="0" smtClean="0">
-                          <a:effectLst/>
-                        </a:rPr>
-                        <a:t>more advantageous</a:t>
-                      </a:r>
-                      <a:r>
-                        <a:rPr lang="ru-RU" sz="1300" baseline="0" dirty="0" smtClean="0">
-                          <a:effectLst/>
-                        </a:rPr>
-                        <a:t> </a:t>
-                      </a:r>
-                      <a:r>
-                        <a:rPr lang="en-US" sz="1300" baseline="0" dirty="0" smtClean="0">
-                          <a:effectLst/>
-                        </a:rPr>
-                        <a:t>option </a:t>
-                      </a:r>
-                      <a:endParaRPr lang="en-US" sz="1300" dirty="0" smtClean="0">
-                        <a:effectLst/>
-                      </a:endParaRPr>
-                    </a:p>
-                  </a:txBody>
-                  <a:tcPr marL="87285" marR="87285" marT="43642" marB="43642"/>
-                </a:tc>
-                <a:tc>
-                  <a:txBody>
-                    <a:bodyPr/>
-                    <a:lstStyle/>
-                    <a:p>
-                      <a:r>
-                        <a:rPr lang="en-US" sz="1300" dirty="0" smtClean="0"/>
-                        <a:t>25% discount will be given for the travel </a:t>
-                      </a:r>
-                      <a:r>
-                        <a:rPr lang="en-US" sz="1300" dirty="0" smtClean="0"/>
-                        <a:t>card </a:t>
-                      </a:r>
-                      <a:endParaRPr lang="en-US" sz="1300" dirty="0"/>
-                    </a:p>
-                  </a:txBody>
-                  <a:tcPr marL="87285" marR="87285" marT="43642" marB="43642"/>
-                </a:tc>
-              </a:tr>
-              <a:tr h="494613">
-                <a:tc>
-                  <a:txBody>
-                    <a:bodyPr/>
-                    <a:lstStyle/>
-                    <a:p>
-                      <a:r>
-                        <a:rPr lang="en-US" sz="1300" dirty="0" smtClean="0"/>
-                        <a:t>2</a:t>
-                      </a:r>
-                      <a:endParaRPr lang="en-US" sz="1300" dirty="0"/>
-                    </a:p>
-                  </a:txBody>
-                  <a:tcPr marL="87285" marR="87285" marT="43642" marB="43642"/>
+                  <a:tcPr marL="86380" marR="86380" marT="43190" marB="43190"/>
                 </a:tc>
                 <a:tc>
                   <a:txBody>
@@ -8980,41 +8604,38 @@
                         <a:defRPr/>
                       </a:pPr>
                       <a:r>
-                        <a:rPr lang="en-US" sz="1300" dirty="0" smtClean="0"/>
-                        <a:t>A</a:t>
-                      </a:r>
-                      <a:r>
-                        <a:rPr lang="en-US" sz="1300" baseline="0" dirty="0" smtClean="0"/>
-                        <a:t> person is a student and pensioner or just a </a:t>
-                      </a:r>
-                      <a:r>
-                        <a:rPr lang="en-US" sz="1300" baseline="0" dirty="0" smtClean="0"/>
-                        <a:t>student. He chooses more </a:t>
-                      </a:r>
-                      <a:r>
-                        <a:rPr lang="en-US" sz="1300" dirty="0" smtClean="0">
-                          <a:effectLst/>
+                        <a:rPr lang="en-US" sz="1700" dirty="0" smtClean="0">
+                          <a:solidFill>
+                            <a:schemeClr val="bg1"/>
+                          </a:solidFill>
+                          <a:latin typeface="Open Sans" panose="020B0604020202020204" charset="0"/>
+                          <a:ea typeface="Open Sans" panose="020B0604020202020204" charset="0"/>
+                          <a:cs typeface="Open Sans" panose="020B0604020202020204" charset="0"/>
                         </a:rPr>
-                        <a:t>more advantageous</a:t>
-                      </a:r>
-                      <a:r>
-                        <a:rPr lang="ru-RU" sz="1300" baseline="0" dirty="0" smtClean="0">
-                          <a:effectLst/>
+                        <a:t>Test</a:t>
+                      </a:r>
+                      <a:r>
+                        <a:rPr lang="en-US" sz="1700" baseline="0" dirty="0" smtClean="0">
+                          <a:solidFill>
+                            <a:schemeClr val="bg1"/>
+                          </a:solidFill>
+                          <a:latin typeface="Open Sans" panose="020B0604020202020204" charset="0"/>
+                          <a:ea typeface="Open Sans" panose="020B0604020202020204" charset="0"/>
+                          <a:cs typeface="Open Sans" panose="020B0604020202020204" charset="0"/>
                         </a:rPr>
-                        <a:t> </a:t>
-                      </a:r>
-                      <a:r>
-                        <a:rPr lang="en-US" sz="1300" baseline="0" dirty="0" smtClean="0">
-                          <a:effectLst/>
-                        </a:rPr>
-                        <a:t>option.</a:t>
-                      </a:r>
-                      <a:endParaRPr lang="en-US" sz="1300" dirty="0" smtClean="0">
-                        <a:effectLst/>
+                        <a:t> Items</a:t>
+                      </a:r>
+                      <a:endParaRPr lang="en-US" sz="1700" dirty="0" smtClean="0">
+                        <a:solidFill>
+                          <a:schemeClr val="bg1"/>
+                        </a:solidFill>
+                        <a:latin typeface="Open Sans" panose="020B0604020202020204" charset="0"/>
+                        <a:ea typeface="Open Sans" panose="020B0604020202020204" charset="0"/>
+                        <a:cs typeface="Open Sans" panose="020B0604020202020204" charset="0"/>
                       </a:endParaRPr>
                     </a:p>
                   </a:txBody>
-                  <a:tcPr marL="87285" marR="87285" marT="43642" marB="43642"/>
+                  <a:tcPr marL="86380" marR="86380" marT="43190" marB="43190"/>
                 </a:tc>
                 <a:tc>
                   <a:txBody>
@@ -9039,28 +8660,52 @@
                         <a:defRPr/>
                       </a:pPr>
                       <a:r>
-                        <a:rPr lang="en-US" sz="1300" dirty="0" smtClean="0"/>
-                        <a:t>20% discount will be given for the travel card</a:t>
-                      </a:r>
-                    </a:p>
-                  </a:txBody>
-                  <a:tcPr marL="87285" marR="87285" marT="43642" marB="43642"/>
+                        <a:rPr lang="en-US" sz="1700" smtClean="0">
+                          <a:solidFill>
+                            <a:schemeClr val="bg1"/>
+                          </a:solidFill>
+                          <a:latin typeface="Open Sans" panose="020B0604020202020204" charset="0"/>
+                          <a:ea typeface="Open Sans" panose="020B0604020202020204" charset="0"/>
+                          <a:cs typeface="Open Sans" panose="020B0604020202020204" charset="0"/>
+                        </a:rPr>
+                        <a:t>Test Data</a:t>
+                      </a:r>
+                      <a:endParaRPr lang="en-US" sz="1700" dirty="0" smtClean="0">
+                        <a:solidFill>
+                          <a:schemeClr val="bg1"/>
+                        </a:solidFill>
+                        <a:latin typeface="Open Sans" panose="020B0604020202020204" charset="0"/>
+                        <a:ea typeface="Open Sans" panose="020B0604020202020204" charset="0"/>
+                        <a:cs typeface="Open Sans" panose="020B0604020202020204" charset="0"/>
+                      </a:endParaRPr>
+                    </a:p>
+                  </a:txBody>
+                  <a:tcPr marL="86380" marR="86380" marT="43190" marB="43190"/>
                 </a:tc>
               </a:tr>
-              <a:tr h="494613">
-                <a:tc>
-                  <a:txBody>
-                    <a:bodyPr/>
-                    <a:lstStyle/>
-                    <a:p>
-                      <a:r>
-                        <a:rPr lang="en-US" sz="1300" dirty="0" smtClean="0"/>
-                        <a:t>3</a:t>
-                      </a:r>
-                      <a:endParaRPr lang="en-US" sz="1300" dirty="0"/>
-                    </a:p>
-                  </a:txBody>
-                  <a:tcPr marL="87285" marR="87285" marT="43642" marB="43642"/>
+              <a:tr h="879655">
+                <a:tc>
+                  <a:txBody>
+                    <a:bodyPr/>
+                    <a:lstStyle/>
+                    <a:p>
+                      <a:r>
+                        <a:rPr lang="en-US" sz="1700" smtClean="0">
+                          <a:solidFill>
+                            <a:schemeClr val="accent5">
+                              <a:lumMod val="75000"/>
+                            </a:schemeClr>
+                          </a:solidFill>
+                          <a:latin typeface="Open Sans" panose="020B0604020202020204" charset="0"/>
+                          <a:ea typeface="Open Sans" panose="020B0604020202020204" charset="0"/>
+                          <a:cs typeface="Open Sans" panose="020B0604020202020204" charset="0"/>
+                        </a:rPr>
+                        <a:t>1</a:t>
+                      </a:r>
+                      <a:endParaRPr lang="en-US" sz="1700" dirty="0"/>
+                    </a:p>
+                  </a:txBody>
+                  <a:tcPr marL="86380" marR="86380" marT="43190" marB="43190"/>
                 </a:tc>
                 <a:tc>
                   <a:txBody>
@@ -9085,18 +8730,64 @@
                         <a:defRPr/>
                       </a:pPr>
                       <a:r>
-                        <a:rPr lang="en-US" sz="1300" dirty="0" smtClean="0"/>
-                        <a:t>A</a:t>
-                      </a:r>
-                      <a:r>
-                        <a:rPr lang="en-US" sz="1300" baseline="0" dirty="0" smtClean="0"/>
-                        <a:t> person is a pensioner and buying card again during  6 month</a:t>
-                      </a:r>
-                      <a:endParaRPr lang="en-US" sz="1300" dirty="0" smtClean="0"/>
-                    </a:p>
-                  </a:txBody>
-                  <a:tcPr marL="87285" marR="87285" marT="43642" marB="43642"/>
-                </a:tc>
+                        <a:rPr lang="en-US" sz="1700" smtClean="0"/>
+                        <a:t>Verify</a:t>
+                      </a:r>
+                      <a:r>
+                        <a:rPr lang="en-US" sz="1700" baseline="0" smtClean="0"/>
+                        <a:t> that </a:t>
+                      </a:r>
+                      <a:r>
+                        <a:rPr lang="en-US" sz="1700" b="0" i="0" u="none" strike="noStrike" smtClean="0">
+                          <a:solidFill>
+                            <a:srgbClr val="000000"/>
+                          </a:solidFill>
+                          <a:effectLst/>
+                          <a:latin typeface="Calibri" charset="0"/>
+                          <a:ea typeface="Calibri" charset="0"/>
+                          <a:cs typeface="Calibri" charset="0"/>
+                        </a:rPr>
+                        <a:t>System allows to make replenishment with no commission</a:t>
+                      </a:r>
+                    </a:p>
+                    <a:p>
+                      <a:endParaRPr lang="en-US" sz="1700" dirty="0"/>
+                    </a:p>
+                  </a:txBody>
+                  <a:tcPr marL="86380" marR="86380" marT="43190" marB="43190"/>
+                </a:tc>
+                <a:tc>
+                  <a:txBody>
+                    <a:bodyPr/>
+                    <a:lstStyle/>
+                    <a:p>
+                      <a:r>
+                        <a:rPr lang="en-US" sz="1700" dirty="0" smtClean="0"/>
+                        <a:t>1. Any number from 5</a:t>
+                      </a:r>
+                      <a:r>
+                        <a:rPr lang="en-US" sz="1700" baseline="0" dirty="0" smtClean="0"/>
+                        <a:t> to 49 (e.g. 25)</a:t>
+                      </a:r>
+                    </a:p>
+                    <a:p>
+                      <a:r>
+                        <a:rPr lang="en-US" sz="1700" baseline="0" dirty="0" smtClean="0"/>
+                        <a:t>2. 5</a:t>
+                      </a:r>
+                    </a:p>
+                    <a:p>
+                      <a:r>
+                        <a:rPr lang="en-US" sz="1700" baseline="0" dirty="0" smtClean="0"/>
+                        <a:t>3. 49</a:t>
+                      </a:r>
+                      <a:endParaRPr lang="en-US" sz="1700" dirty="0"/>
+                    </a:p>
+                  </a:txBody>
+                  <a:tcPr marL="86380" marR="86380" marT="43190" marB="43190"/>
+                </a:tc>
+              </a:tr>
+              <a:tr h="1144080">
                 <a:tc>
                   <a:txBody>
                     <a:bodyPr/>
@@ -9120,32 +8811,31 @@
                         <a:defRPr/>
                       </a:pPr>
                       <a:r>
-                        <a:rPr lang="en-US" sz="1300" baseline="0" dirty="0" smtClean="0"/>
-                        <a:t>15 </a:t>
-                      </a:r>
-                      <a:r>
-                        <a:rPr lang="en-US" sz="1300" dirty="0" smtClean="0"/>
-                        <a:t>% discount will be given for the travel card</a:t>
-                      </a:r>
-                    </a:p>
-                  </a:txBody>
-                  <a:tcPr marL="87285" marR="87285" marT="43642" marB="43642"/>
-                </a:tc>
-              </a:tr>
-              <a:tr h="353988">
-                <a:tc>
-                  <a:txBody>
-                    <a:bodyPr/>
-                    <a:lstStyle/>
-                    <a:p>
-                      <a:r>
-                        <a:rPr lang="en-US" sz="1300" dirty="0" smtClean="0"/>
-                        <a:t>4</a:t>
-                      </a:r>
-                      <a:endParaRPr lang="en-US" sz="1300" dirty="0"/>
-                    </a:p>
-                  </a:txBody>
-                  <a:tcPr marL="87285" marR="87285" marT="43642" marB="43642"/>
+                        <a:rPr lang="en-US" sz="1700" smtClean="0">
+                          <a:solidFill>
+                            <a:schemeClr val="accent5">
+                              <a:lumMod val="75000"/>
+                            </a:schemeClr>
+                          </a:solidFill>
+                          <a:latin typeface="Open Sans" panose="020B0604020202020204" charset="0"/>
+                          <a:ea typeface="Open Sans" panose="020B0604020202020204" charset="0"/>
+                          <a:cs typeface="Open Sans" panose="020B0604020202020204" charset="0"/>
+                        </a:rPr>
+                        <a:t>2</a:t>
+                      </a:r>
+                      <a:endParaRPr lang="en-US" sz="1700" dirty="0" smtClean="0">
+                        <a:solidFill>
+                          <a:schemeClr val="accent5">
+                            <a:lumMod val="75000"/>
+                          </a:schemeClr>
+                        </a:solidFill>
+                        <a:latin typeface="Open Sans" panose="020B0604020202020204" charset="0"/>
+                        <a:ea typeface="Open Sans" panose="020B0604020202020204" charset="0"/>
+                        <a:cs typeface="Open Sans" panose="020B0604020202020204" charset="0"/>
+                      </a:endParaRPr>
+                    </a:p>
+                  </a:txBody>
+                  <a:tcPr marL="86380" marR="86380" marT="43190" marB="43190"/>
                 </a:tc>
                 <a:tc>
                   <a:txBody>
@@ -9170,17 +8860,30 @@
                         <a:defRPr/>
                       </a:pPr>
                       <a:r>
-                        <a:rPr lang="en-US" sz="1300" dirty="0" smtClean="0"/>
-                        <a:t>A</a:t>
-                      </a:r>
-                      <a:r>
-                        <a:rPr lang="en-US" sz="1300" baseline="0" dirty="0" smtClean="0"/>
-                        <a:t> person is a pensioner</a:t>
-                      </a:r>
-                      <a:endParaRPr lang="en-US" sz="1300" dirty="0" smtClean="0"/>
-                    </a:p>
-                  </a:txBody>
-                  <a:tcPr marL="87285" marR="87285" marT="43642" marB="43642"/>
+                        <a:rPr lang="en-US" sz="1700" dirty="0" smtClean="0"/>
+                        <a:t>Verify that </a:t>
+                      </a:r>
+                      <a:r>
+                        <a:rPr lang="en-US" sz="1700" b="0" i="0" u="none" strike="noStrike" dirty="0" smtClean="0">
+                          <a:solidFill>
+                            <a:srgbClr val="000000"/>
+                          </a:solidFill>
+                          <a:effectLst/>
+                          <a:latin typeface="Calibri" charset="0"/>
+                          <a:ea typeface="Calibri" charset="0"/>
+                          <a:cs typeface="Calibri" charset="0"/>
+                        </a:rPr>
+                        <a:t>System makes replenishment with 1% commission</a:t>
+                      </a:r>
+                    </a:p>
+                    <a:p>
+                      <a:endParaRPr lang="en-US" sz="1700" dirty="0" smtClean="0"/>
+                    </a:p>
+                    <a:p>
+                      <a:endParaRPr lang="en-US" sz="1700" dirty="0"/>
+                    </a:p>
+                  </a:txBody>
+                  <a:tcPr marL="86380" marR="86380" marT="43190" marB="43190"/>
                 </a:tc>
                 <a:tc>
                   <a:txBody>
@@ -9205,33 +8908,32 @@
                         <a:defRPr/>
                       </a:pPr>
                       <a:r>
-                        <a:rPr lang="en-US" sz="1300" baseline="0" dirty="0" smtClean="0"/>
-                        <a:t>10 </a:t>
-                      </a:r>
-                      <a:r>
-                        <a:rPr lang="en-US" sz="1300" dirty="0" smtClean="0"/>
-                        <a:t>% discount will be given for the travel card</a:t>
-                      </a:r>
-                    </a:p>
-                  </a:txBody>
-                  <a:tcPr marL="87285" marR="87285" marT="43642" marB="43642"/>
+                        <a:rPr lang="en-US" sz="1700" dirty="0" smtClean="0"/>
+                        <a:t>1. Any number from 50</a:t>
+                      </a:r>
+                      <a:r>
+                        <a:rPr lang="en-US" sz="1700" baseline="0" dirty="0" smtClean="0"/>
+                        <a:t> to 499 (e.g. 322)</a:t>
+                      </a:r>
+                    </a:p>
+                    <a:p>
+                      <a:r>
+                        <a:rPr lang="en-US" sz="1700" baseline="0" dirty="0" smtClean="0"/>
+                        <a:t>2. 50</a:t>
+                      </a:r>
+                    </a:p>
+                    <a:p>
+                      <a:r>
+                        <a:rPr lang="en-US" sz="1700" baseline="0" dirty="0" smtClean="0"/>
+                        <a:t>3. 499</a:t>
+                      </a:r>
+                      <a:endParaRPr lang="en-US" sz="1700" dirty="0"/>
+                    </a:p>
+                  </a:txBody>
+                  <a:tcPr marL="86380" marR="86380" marT="43190" marB="43190"/>
                 </a:tc>
               </a:tr>
-              <a:tr h="353988">
-                <a:tc>
-                  <a:txBody>
-                    <a:bodyPr/>
-                    <a:lstStyle/>
-                    <a:p>
-                      <a:r>
-                        <a:rPr lang="en-US" sz="1300" dirty="0" smtClean="0"/>
-                        <a:t>5</a:t>
-                      </a:r>
-                      <a:endParaRPr lang="en-US" sz="1300" dirty="0"/>
-                    </a:p>
-                  </a:txBody>
-                  <a:tcPr marL="87285" marR="87285" marT="43642" marB="43642"/>
-                </a:tc>
+              <a:tr h="1144080">
                 <a:tc>
                   <a:txBody>
                     <a:bodyPr/>
@@ -9255,12 +8957,21 @@
                         <a:defRPr/>
                       </a:pPr>
                       <a:r>
-                        <a:rPr lang="en-US" sz="1300" dirty="0" smtClean="0"/>
-                        <a:t>A person buying travel card again during last 6 month</a:t>
-                      </a:r>
-                    </a:p>
-                  </a:txBody>
-                  <a:tcPr marL="87285" marR="87285" marT="43642" marB="43642"/>
+                        <a:rPr lang="en-US" sz="1700" dirty="0" smtClean="0">
+                          <a:solidFill>
+                            <a:schemeClr val="accent5">
+                              <a:lumMod val="75000"/>
+                            </a:schemeClr>
+                          </a:solidFill>
+                          <a:latin typeface="Open Sans" panose="020B0604020202020204" charset="0"/>
+                          <a:ea typeface="Open Sans" panose="020B0604020202020204" charset="0"/>
+                          <a:cs typeface="Open Sans" panose="020B0604020202020204" charset="0"/>
+                        </a:rPr>
+                        <a:t>3</a:t>
+                      </a:r>
+                    </a:p>
+                  </a:txBody>
+                  <a:tcPr marL="86380" marR="86380" marT="43190" marB="43190"/>
                 </a:tc>
                 <a:tc>
                   <a:txBody>
@@ -9285,32 +8996,27 @@
                         <a:defRPr/>
                       </a:pPr>
                       <a:r>
-                        <a:rPr lang="en-US" sz="1300" baseline="0" dirty="0" smtClean="0"/>
-                        <a:t>5 </a:t>
-                      </a:r>
-                      <a:r>
-                        <a:rPr lang="en-US" sz="1300" dirty="0" smtClean="0"/>
-                        <a:t>% discount will be given for the travel card</a:t>
-                      </a:r>
-                    </a:p>
-                  </a:txBody>
-                  <a:tcPr marL="87285" marR="87285" marT="43642" marB="43642"/>
-                </a:tc>
-              </a:tr>
-              <a:tr h="353988">
-                <a:tc>
-                  <a:txBody>
-                    <a:bodyPr/>
-                    <a:lstStyle/>
-                    <a:p>
-                      <a:r>
-                        <a:rPr lang="en-US" sz="1300" dirty="0" smtClean="0"/>
-                        <a:t>6</a:t>
-                      </a:r>
-                      <a:endParaRPr lang="en-US" sz="1300" dirty="0"/>
-                    </a:p>
-                  </a:txBody>
-                  <a:tcPr marL="87285" marR="87285" marT="43642" marB="43642"/>
+                        <a:rPr lang="en-US" sz="1700" dirty="0" smtClean="0"/>
+                        <a:t>Verify that </a:t>
+                      </a:r>
+                      <a:r>
+                        <a:rPr lang="en-US" sz="1700" b="0" i="0" u="none" strike="noStrike" dirty="0" smtClean="0">
+                          <a:solidFill>
+                            <a:srgbClr val="000000"/>
+                          </a:solidFill>
+                          <a:effectLst/>
+                          <a:latin typeface="Calibri" charset="0"/>
+                          <a:ea typeface="Calibri" charset="0"/>
+                          <a:cs typeface="Calibri" charset="0"/>
+                        </a:rPr>
+                        <a:t>System makes replenishment with 3% commission</a:t>
+                      </a:r>
+                    </a:p>
+                    <a:p>
+                      <a:endParaRPr lang="en-US" sz="1700" dirty="0"/>
+                    </a:p>
+                  </a:txBody>
+                  <a:tcPr marL="86380" marR="86380" marT="43190" marB="43190"/>
                 </a:tc>
                 <a:tc>
                   <a:txBody>
@@ -9335,13 +9041,35 @@
                         <a:defRPr/>
                       </a:pPr>
                       <a:r>
-                        <a:rPr lang="en-US" sz="1300" dirty="0" smtClean="0"/>
-                        <a:t>A person not a student not pensioner</a:t>
-                      </a:r>
-                    </a:p>
-                  </a:txBody>
-                  <a:tcPr marL="87285" marR="87285" marT="43642" marB="43642"/>
-                </a:tc>
+                        <a:rPr lang="en-US" sz="1700" dirty="0" smtClean="0"/>
+                        <a:t>1. Any number from 500</a:t>
+                      </a:r>
+                      <a:r>
+                        <a:rPr lang="en-US" sz="1700" baseline="0" dirty="0" smtClean="0"/>
+                        <a:t> to 1000 (e.g. 655)</a:t>
+                      </a:r>
+                    </a:p>
+                    <a:p>
+                      <a:r>
+                        <a:rPr lang="en-US" sz="1700" baseline="0" dirty="0" smtClean="0"/>
+                        <a:t>2. 500</a:t>
+                      </a:r>
+                    </a:p>
+                    <a:p>
+                      <a:r>
+                        <a:rPr lang="en-US" sz="1700" baseline="0" dirty="0" smtClean="0"/>
+                        <a:t>3. 1000</a:t>
+                      </a:r>
+                      <a:endParaRPr lang="en-US" sz="1700" dirty="0" smtClean="0"/>
+                    </a:p>
+                    <a:p>
+                      <a:endParaRPr lang="en-US" sz="1700" dirty="0"/>
+                    </a:p>
+                  </a:txBody>
+                  <a:tcPr marL="86380" marR="86380" marT="43190" marB="43190"/>
+                </a:tc>
+              </a:tr>
+              <a:tr h="1672930">
                 <a:tc>
                   <a:txBody>
                     <a:bodyPr/>
@@ -9365,16 +9093,277 @@
                         <a:defRPr/>
                       </a:pPr>
                       <a:r>
-                        <a:rPr lang="en-US" sz="1300" baseline="0" dirty="0" smtClean="0"/>
-                        <a:t>No </a:t>
-                      </a:r>
-                      <a:r>
-                        <a:rPr lang="en-US" sz="1300" dirty="0" smtClean="0"/>
-                        <a:t>discount will be given for the travel card</a:t>
-                      </a:r>
-                    </a:p>
-                  </a:txBody>
-                  <a:tcPr marL="87285" marR="87285" marT="43642" marB="43642"/>
+                        <a:rPr lang="en-US" sz="1700" dirty="0" smtClean="0">
+                          <a:solidFill>
+                            <a:schemeClr val="accent5">
+                              <a:lumMod val="75000"/>
+                            </a:schemeClr>
+                          </a:solidFill>
+                          <a:latin typeface="Open Sans" panose="020B0604020202020204" charset="0"/>
+                          <a:ea typeface="Open Sans" panose="020B0604020202020204" charset="0"/>
+                          <a:cs typeface="Open Sans" panose="020B0604020202020204" charset="0"/>
+                        </a:rPr>
+                        <a:t>4</a:t>
+                      </a:r>
+                    </a:p>
+                  </a:txBody>
+                  <a:tcPr marL="86380" marR="86380" marT="43190" marB="43190"/>
+                </a:tc>
+                <a:tc>
+                  <a:txBody>
+                    <a:bodyPr/>
+                    <a:lstStyle/>
+                    <a:p>
+                      <a:pPr marL="0" marR="0" indent="0" algn="l" defTabSz="914400" rtl="0" eaLnBrk="1" fontAlgn="auto" latinLnBrk="0" hangingPunct="1">
+                        <a:lnSpc>
+                          <a:spcPct val="100000"/>
+                        </a:lnSpc>
+                        <a:spcBef>
+                          <a:spcPts val="0"/>
+                        </a:spcBef>
+                        <a:spcAft>
+                          <a:spcPts val="0"/>
+                        </a:spcAft>
+                        <a:buClrTx/>
+                        <a:buSzTx/>
+                        <a:buFontTx/>
+                        <a:buNone/>
+                        <a:tabLst/>
+                        <a:defRPr/>
+                      </a:pPr>
+                      <a:r>
+                        <a:rPr lang="en-US" sz="1700" dirty="0" smtClean="0"/>
+                        <a:t>Verify that </a:t>
+                      </a:r>
+                      <a:r>
+                        <a:rPr lang="en-US" sz="1700" b="0" i="0" u="none" strike="noStrike" dirty="0" smtClean="0">
+                          <a:solidFill>
+                            <a:srgbClr val="000000"/>
+                          </a:solidFill>
+                          <a:effectLst/>
+                          <a:latin typeface="Calibri" charset="0"/>
+                          <a:ea typeface="Calibri" charset="0"/>
+                          <a:cs typeface="Calibri" charset="0"/>
+                        </a:rPr>
+                        <a:t>error message appears if user</a:t>
+                      </a:r>
+                      <a:r>
+                        <a:rPr lang="en-US" sz="1700" b="0" i="0" u="none" strike="noStrike" baseline="0" dirty="0" smtClean="0">
+                          <a:solidFill>
+                            <a:srgbClr val="000000"/>
+                          </a:solidFill>
+                          <a:effectLst/>
+                          <a:latin typeface="Calibri" charset="0"/>
+                          <a:ea typeface="Calibri" charset="0"/>
+                          <a:cs typeface="Calibri" charset="0"/>
+                        </a:rPr>
+                        <a:t> entering incorrect data</a:t>
+                      </a:r>
+                      <a:endParaRPr lang="en-US" sz="1700" b="0" i="0" u="none" strike="noStrike" dirty="0" smtClean="0">
+                        <a:solidFill>
+                          <a:srgbClr val="000000"/>
+                        </a:solidFill>
+                        <a:effectLst/>
+                        <a:latin typeface="Calibri" charset="0"/>
+                        <a:ea typeface="Calibri" charset="0"/>
+                        <a:cs typeface="Calibri" charset="0"/>
+                      </a:endParaRPr>
+                    </a:p>
+                    <a:p>
+                      <a:endParaRPr lang="en-US" sz="1700" dirty="0"/>
+                    </a:p>
+                  </a:txBody>
+                  <a:tcPr marL="86380" marR="86380" marT="43190" marB="43190"/>
+                </a:tc>
+                <a:tc>
+                  <a:txBody>
+                    <a:bodyPr/>
+                    <a:lstStyle/>
+                    <a:p>
+                      <a:pPr marL="342900" indent="-342900">
+                        <a:buAutoNum type="arabicPeriod"/>
+                      </a:pPr>
+                      <a:r>
+                        <a:rPr lang="en-US" sz="1700" dirty="0" smtClean="0"/>
+                        <a:t>Any</a:t>
+                      </a:r>
+                      <a:r>
+                        <a:rPr lang="en-US" sz="1700" baseline="0" dirty="0" smtClean="0"/>
+                        <a:t> number from 0  and &lt;5</a:t>
+                      </a:r>
+                    </a:p>
+                    <a:p>
+                      <a:pPr marL="342900" indent="-342900">
+                        <a:buAutoNum type="arabicPeriod"/>
+                      </a:pPr>
+                      <a:r>
+                        <a:rPr lang="en-US" sz="1700" baseline="0" dirty="0" smtClean="0"/>
+                        <a:t>Any number &gt;1000 (e.g. 1201)</a:t>
+                      </a:r>
+                    </a:p>
+                    <a:p>
+                      <a:pPr marL="342900" indent="-342900">
+                        <a:buAutoNum type="arabicPeriod"/>
+                      </a:pPr>
+                      <a:r>
+                        <a:rPr lang="en-US" sz="1700" dirty="0" smtClean="0"/>
+                        <a:t>Alphabetical characters</a:t>
+                      </a:r>
+                    </a:p>
+                    <a:p>
+                      <a:pPr marL="342900" indent="-342900">
+                        <a:buAutoNum type="arabicPeriod"/>
+                      </a:pPr>
+                      <a:r>
+                        <a:rPr lang="en-US" sz="1700" dirty="0" smtClean="0"/>
+                        <a:t>Special</a:t>
+                      </a:r>
+                      <a:r>
+                        <a:rPr lang="en-US" sz="1700" baseline="0" dirty="0" smtClean="0"/>
+                        <a:t> </a:t>
+                      </a:r>
+                      <a:r>
+                        <a:rPr lang="en-US" sz="1700" baseline="0" dirty="0" smtClean="0"/>
+                        <a:t>characters</a:t>
+                      </a:r>
+                    </a:p>
+                    <a:p>
+                      <a:pPr marL="342900" indent="-342900">
+                        <a:buAutoNum type="arabicPeriod"/>
+                      </a:pPr>
+                      <a:r>
+                        <a:rPr lang="en-US" sz="1700" baseline="0" dirty="0" smtClean="0"/>
+                        <a:t>Decimal number (e.g. 125.06)</a:t>
+                      </a:r>
+                    </a:p>
+                    <a:p>
+                      <a:pPr marL="342900" indent="-342900">
+                        <a:buAutoNum type="arabicPeriod"/>
+                      </a:pPr>
+                      <a:r>
+                        <a:rPr lang="en-US" sz="1700" baseline="0" dirty="0" smtClean="0"/>
+                        <a:t>Decimal number (e.g. 22,45)</a:t>
+                      </a:r>
+                    </a:p>
+                  </a:txBody>
+                  <a:tcPr marL="86380" marR="86380" marT="43190" marB="43190"/>
+                </a:tc>
+              </a:tr>
+              <a:tr h="879655">
+                <a:tc>
+                  <a:txBody>
+                    <a:bodyPr/>
+                    <a:lstStyle/>
+                    <a:p>
+                      <a:pPr marL="0" marR="0" indent="0" algn="l" defTabSz="914400" rtl="0" eaLnBrk="1" fontAlgn="auto" latinLnBrk="0" hangingPunct="1">
+                        <a:lnSpc>
+                          <a:spcPct val="100000"/>
+                        </a:lnSpc>
+                        <a:spcBef>
+                          <a:spcPts val="0"/>
+                        </a:spcBef>
+                        <a:spcAft>
+                          <a:spcPts val="0"/>
+                        </a:spcAft>
+                        <a:buClrTx/>
+                        <a:buSzTx/>
+                        <a:buFontTx/>
+                        <a:buNone/>
+                        <a:tabLst/>
+                        <a:defRPr/>
+                      </a:pPr>
+                      <a:r>
+                        <a:rPr lang="en-US" sz="1700" dirty="0" smtClean="0">
+                          <a:solidFill>
+                            <a:schemeClr val="accent5">
+                              <a:lumMod val="75000"/>
+                            </a:schemeClr>
+                          </a:solidFill>
+                          <a:latin typeface="Open Sans" panose="020B0604020202020204" charset="0"/>
+                          <a:ea typeface="Open Sans" panose="020B0604020202020204" charset="0"/>
+                          <a:cs typeface="Open Sans" panose="020B0604020202020204" charset="0"/>
+                        </a:rPr>
+                        <a:t>5</a:t>
+                      </a:r>
+                    </a:p>
+                  </a:txBody>
+                  <a:tcPr marL="86380" marR="86380" marT="43190" marB="43190"/>
+                </a:tc>
+                <a:tc>
+                  <a:txBody>
+                    <a:bodyPr/>
+                    <a:lstStyle/>
+                    <a:p>
+                      <a:pPr marL="0" marR="0" indent="0" algn="l" defTabSz="914400" rtl="0" eaLnBrk="1" fontAlgn="auto" latinLnBrk="0" hangingPunct="1">
+                        <a:lnSpc>
+                          <a:spcPct val="100000"/>
+                        </a:lnSpc>
+                        <a:spcBef>
+                          <a:spcPts val="0"/>
+                        </a:spcBef>
+                        <a:spcAft>
+                          <a:spcPts val="0"/>
+                        </a:spcAft>
+                        <a:buClrTx/>
+                        <a:buSzTx/>
+                        <a:buFontTx/>
+                        <a:buNone/>
+                        <a:tabLst/>
+                        <a:defRPr/>
+                      </a:pPr>
+                      <a:r>
+                        <a:rPr lang="en-US" sz="1700" dirty="0" smtClean="0"/>
+                        <a:t>Verify that </a:t>
+                      </a:r>
+                      <a:r>
+                        <a:rPr lang="en-US" sz="1700" b="0" i="0" u="none" strike="noStrike" dirty="0" smtClean="0">
+                          <a:solidFill>
+                            <a:srgbClr val="000000"/>
+                          </a:solidFill>
+                          <a:effectLst/>
+                          <a:latin typeface="Calibri" charset="0"/>
+                          <a:ea typeface="Calibri" charset="0"/>
+                          <a:cs typeface="Calibri" charset="0"/>
+                        </a:rPr>
+                        <a:t>error message appears if user</a:t>
+                      </a:r>
+                      <a:r>
+                        <a:rPr lang="en-US" sz="1700" b="0" i="0" u="none" strike="noStrike" baseline="0" dirty="0" smtClean="0">
+                          <a:solidFill>
+                            <a:srgbClr val="000000"/>
+                          </a:solidFill>
+                          <a:effectLst/>
+                          <a:latin typeface="Calibri" charset="0"/>
+                          <a:ea typeface="Calibri" charset="0"/>
+                          <a:cs typeface="Calibri" charset="0"/>
+                        </a:rPr>
+                        <a:t> leaves field empty </a:t>
+                      </a:r>
+                      <a:endParaRPr lang="en-US" sz="1700" b="0" i="0" u="none" strike="noStrike" dirty="0" smtClean="0">
+                        <a:solidFill>
+                          <a:srgbClr val="000000"/>
+                        </a:solidFill>
+                        <a:effectLst/>
+                        <a:latin typeface="Calibri" charset="0"/>
+                        <a:ea typeface="Calibri" charset="0"/>
+                        <a:cs typeface="Calibri" charset="0"/>
+                      </a:endParaRPr>
+                    </a:p>
+                    <a:p>
+                      <a:endParaRPr lang="en-US" sz="1700" dirty="0"/>
+                    </a:p>
+                  </a:txBody>
+                  <a:tcPr marL="86380" marR="86380" marT="43190" marB="43190"/>
+                </a:tc>
+                <a:tc>
+                  <a:txBody>
+                    <a:bodyPr/>
+                    <a:lstStyle/>
+                    <a:p>
+                      <a:endParaRPr lang="en-US" sz="1700" dirty="0"/>
+                    </a:p>
+                  </a:txBody>
+                  <a:tcPr marL="86380" marR="86380" marT="43190" marB="43190"/>
                 </a:tc>
               </a:tr>
             </a:tbl>
@@ -9384,7 +9373,7 @@
     </p:spTree>
     <p:extLst>
       <p:ext uri="{BB962C8B-B14F-4D97-AF65-F5344CB8AC3E}">
-        <p14:creationId xmlns:p14="http://schemas.microsoft.com/office/powerpoint/2010/main" val="1072791779"/>
+        <p14:creationId xmlns:p14="http://schemas.microsoft.com/office/powerpoint/2010/main" val="91869973"/>
       </p:ext>
     </p:extLst>
   </p:cSld>
@@ -9424,7 +9413,7 @@
         <p:spPr>
           <a:xfrm>
             <a:off x="838200" y="610235"/>
-            <a:ext cx="10515600" cy="1773201"/>
+            <a:ext cx="10515600" cy="1263535"/>
           </a:xfrm>
         </p:spPr>
         <p:txBody>
@@ -9437,18 +9426,17 @@
               <a:buNone/>
             </a:pPr>
             <a:r>
-              <a:rPr lang="en-US" sz="1600" dirty="0" smtClean="0"/>
-              <a:t>State transition User wants to pay for using the Internet with Payment card. He enters amount of money he needs to pay, e-mail and press the “Next” button. If entered amount of money is not allowed the user will be asked to correct the sum. In other case will be redirected on payment page. On this page user should enter the 16-digit number of card, period of validity and code of CVV2/CVC2 and then press “Pay”. If entered info is correct user will get email-notification on his email that operation completed success. If some data were entered incorrectly, user will get error-notification on the screen and he should correct it and again press “Pay”.</a:t>
+              <a:rPr lang="en-US" sz="1200" dirty="0" smtClean="0"/>
+              <a:t>Decision tables You want to buy travel card of some transport network (works during 1 month). The following types of discount exist: </a:t>
             </a:r>
-          </a:p>
-          <a:p>
             <a:r>
-              <a:rPr lang="en-US" sz="1600" dirty="0" smtClean="0"/>
-              <a:t>Build state transition diagram based on given information</a:t>
+              <a:rPr lang="en-US" sz="1200" dirty="0"/>
+              <a:t>F</a:t>
             </a:r>
-          </a:p>
-          <a:p>
-            <a:endParaRPr lang="en-US" sz="1600" dirty="0"/>
+            <a:r>
+              <a:rPr lang="en-US" sz="1200" dirty="0" smtClean="0"/>
+              <a:t>or Student – gives you 20% discount if you are student; Pensioner– gives you 10% discount, available if you are 60 years old and more (cannot be used with Student discount) You can get additional 5% discount if you are buying such travel cards during the last 6 months in a row.</a:t>
+            </a:r>
           </a:p>
         </p:txBody>
       </p:sp>
@@ -9470,21 +9458,1411 @@
         </p:spPr>
         <p:txBody>
           <a:bodyPr>
-            <a:normAutofit fontScale="90000"/>
+            <a:normAutofit/>
           </a:bodyPr>
           <a:lstStyle/>
           <a:p>
             <a:r>
-              <a:rPr lang="en-US" sz="3200" dirty="0" smtClean="0"/>
+              <a:rPr lang="en-US" sz="2400" b="1" dirty="0" smtClean="0">
+                <a:solidFill>
+                  <a:schemeClr val="accent1">
+                    <a:lumMod val="75000"/>
+                  </a:schemeClr>
+                </a:solidFill>
+              </a:rPr>
+              <a:t>Decision table</a:t>
+            </a:r>
+            <a:endParaRPr lang="en-US" sz="2400" b="1" dirty="0">
+              <a:solidFill>
+                <a:schemeClr val="accent1">
+                  <a:lumMod val="75000"/>
+                </a:schemeClr>
+              </a:solidFill>
+            </a:endParaRPr>
+          </a:p>
+        </p:txBody>
+      </p:sp>
+      <p:graphicFrame>
+        <p:nvGraphicFramePr>
+          <p:cNvPr id="7" name="Table 6"/>
+          <p:cNvGraphicFramePr>
+            <a:graphicFrameLocks noGrp="1"/>
+          </p:cNvGraphicFramePr>
+          <p:nvPr>
+            <p:extLst>
+              <p:ext uri="{D42A27DB-BD31-4B8C-83A1-F6EECF244321}">
+                <p14:modId xmlns:p14="http://schemas.microsoft.com/office/powerpoint/2010/main" val="551177668"/>
+              </p:ext>
+            </p:extLst>
+          </p:nvPr>
+        </p:nvGraphicFramePr>
+        <p:xfrm>
+          <a:off x="838200" y="1242002"/>
+          <a:ext cx="7919432" cy="2180310"/>
+        </p:xfrm>
+        <a:graphic>
+          <a:graphicData uri="http://schemas.openxmlformats.org/drawingml/2006/table">
+            <a:tbl>
+              <a:tblPr firstRow="1" bandRow="1">
+                <a:tableStyleId>{93296810-A885-4BE3-A3E7-6D5BEEA58F35}</a:tableStyleId>
+              </a:tblPr>
+              <a:tblGrid>
+                <a:gridCol w="2074064"/>
+                <a:gridCol w="818261"/>
+                <a:gridCol w="844383"/>
+                <a:gridCol w="1045681"/>
+                <a:gridCol w="1045681"/>
+                <a:gridCol w="1045681"/>
+                <a:gridCol w="1045681"/>
+              </a:tblGrid>
+              <a:tr h="283157">
+                <a:tc>
+                  <a:txBody>
+                    <a:bodyPr/>
+                    <a:lstStyle/>
+                    <a:p>
+                      <a:r>
+                        <a:rPr lang="en-US" sz="1300" dirty="0" smtClean="0"/>
+                        <a:t>Causes (inputs)</a:t>
+                      </a:r>
+                      <a:endParaRPr lang="en-US" sz="1300" dirty="0"/>
+                    </a:p>
+                  </a:txBody>
+                  <a:tcPr marL="84947" marR="84947" marT="42474" marB="42474"/>
+                </a:tc>
+                <a:tc>
+                  <a:txBody>
+                    <a:bodyPr/>
+                    <a:lstStyle/>
+                    <a:p>
+                      <a:r>
+                        <a:rPr lang="en-US" sz="1300" dirty="0" smtClean="0"/>
+                        <a:t>R1/R3</a:t>
+                      </a:r>
+                      <a:endParaRPr lang="en-US" sz="1300" dirty="0"/>
+                    </a:p>
+                  </a:txBody>
+                  <a:tcPr marL="84947" marR="84947" marT="42474" marB="42474"/>
+                </a:tc>
+                <a:tc>
+                  <a:txBody>
+                    <a:bodyPr/>
+                    <a:lstStyle/>
+                    <a:p>
+                      <a:r>
+                        <a:rPr lang="en-US" sz="1300" dirty="0" smtClean="0"/>
+                        <a:t>R2/R4</a:t>
+                      </a:r>
+                      <a:endParaRPr lang="en-US" sz="1300" dirty="0"/>
+                    </a:p>
+                  </a:txBody>
+                  <a:tcPr marL="84947" marR="84947" marT="42474" marB="42474"/>
+                </a:tc>
+                <a:tc>
+                  <a:txBody>
+                    <a:bodyPr/>
+                    <a:lstStyle/>
+                    <a:p>
+                      <a:r>
+                        <a:rPr lang="en-US" sz="1300" dirty="0" smtClean="0"/>
+                        <a:t>R5</a:t>
+                      </a:r>
+                      <a:endParaRPr lang="en-US" sz="1300" dirty="0"/>
+                    </a:p>
+                  </a:txBody>
+                  <a:tcPr marL="84947" marR="84947" marT="42474" marB="42474"/>
+                </a:tc>
+                <a:tc>
+                  <a:txBody>
+                    <a:bodyPr/>
+                    <a:lstStyle/>
+                    <a:p>
+                      <a:r>
+                        <a:rPr lang="en-US" sz="1300" dirty="0" smtClean="0"/>
+                        <a:t>R6</a:t>
+                      </a:r>
+                      <a:endParaRPr lang="en-US" sz="1300" dirty="0"/>
+                    </a:p>
+                  </a:txBody>
+                  <a:tcPr marL="84947" marR="84947" marT="42474" marB="42474"/>
+                </a:tc>
+                <a:tc>
+                  <a:txBody>
+                    <a:bodyPr/>
+                    <a:lstStyle/>
+                    <a:p>
+                      <a:r>
+                        <a:rPr lang="en-US" sz="1300" dirty="0" smtClean="0"/>
+                        <a:t>R7</a:t>
+                      </a:r>
+                      <a:endParaRPr lang="en-US" sz="1300" dirty="0"/>
+                    </a:p>
+                  </a:txBody>
+                  <a:tcPr marL="84947" marR="84947" marT="42474" marB="42474"/>
+                </a:tc>
+                <a:tc>
+                  <a:txBody>
+                    <a:bodyPr/>
+                    <a:lstStyle/>
+                    <a:p>
+                      <a:r>
+                        <a:rPr lang="en-US" sz="1300" dirty="0" smtClean="0"/>
+                        <a:t>R8</a:t>
+                      </a:r>
+                      <a:endParaRPr lang="en-US" sz="1300" dirty="0"/>
+                    </a:p>
+                  </a:txBody>
+                  <a:tcPr marL="84947" marR="84947" marT="42474" marB="42474"/>
+                </a:tc>
+              </a:tr>
+              <a:tr h="283157">
+                <a:tc>
+                  <a:txBody>
+                    <a:bodyPr/>
+                    <a:lstStyle/>
+                    <a:p>
+                      <a:r>
+                        <a:rPr lang="en-US" sz="1300" dirty="0" smtClean="0"/>
+                        <a:t>For Student</a:t>
+                      </a:r>
+                      <a:endParaRPr lang="en-US" sz="1300" dirty="0"/>
+                    </a:p>
+                  </a:txBody>
+                  <a:tcPr marL="84947" marR="84947" marT="42474" marB="42474"/>
+                </a:tc>
+                <a:tc>
+                  <a:txBody>
+                    <a:bodyPr/>
+                    <a:lstStyle/>
+                    <a:p>
+                      <a:r>
+                        <a:rPr lang="en-US" sz="1300" dirty="0" smtClean="0"/>
+                        <a:t>Y</a:t>
+                      </a:r>
+                      <a:endParaRPr lang="en-US" sz="1300" dirty="0"/>
+                    </a:p>
+                  </a:txBody>
+                  <a:tcPr marL="84947" marR="84947" marT="42474" marB="42474"/>
+                </a:tc>
+                <a:tc>
+                  <a:txBody>
+                    <a:bodyPr/>
+                    <a:lstStyle/>
+                    <a:p>
+                      <a:r>
+                        <a:rPr lang="en-US" sz="1300" dirty="0" smtClean="0"/>
+                        <a:t>Y</a:t>
+                      </a:r>
+                      <a:endParaRPr lang="en-US" sz="1300" dirty="0"/>
+                    </a:p>
+                  </a:txBody>
+                  <a:tcPr marL="84947" marR="84947" marT="42474" marB="42474"/>
+                </a:tc>
+                <a:tc>
+                  <a:txBody>
+                    <a:bodyPr/>
+                    <a:lstStyle/>
+                    <a:p>
+                      <a:r>
+                        <a:rPr lang="en-US" sz="1300" dirty="0" smtClean="0"/>
+                        <a:t>N</a:t>
+                      </a:r>
+                      <a:endParaRPr lang="en-US" sz="1300" dirty="0"/>
+                    </a:p>
+                  </a:txBody>
+                  <a:tcPr marL="84947" marR="84947" marT="42474" marB="42474"/>
+                </a:tc>
+                <a:tc>
+                  <a:txBody>
+                    <a:bodyPr/>
+                    <a:lstStyle/>
+                    <a:p>
+                      <a:r>
+                        <a:rPr lang="en-US" sz="1300" dirty="0" smtClean="0"/>
+                        <a:t>N</a:t>
+                      </a:r>
+                      <a:endParaRPr lang="en-US" sz="1300" dirty="0"/>
+                    </a:p>
+                  </a:txBody>
+                  <a:tcPr marL="84947" marR="84947" marT="42474" marB="42474"/>
+                </a:tc>
+                <a:tc>
+                  <a:txBody>
+                    <a:bodyPr/>
+                    <a:lstStyle/>
+                    <a:p>
+                      <a:r>
+                        <a:rPr lang="en-US" sz="1300" dirty="0" smtClean="0"/>
+                        <a:t>N</a:t>
+                      </a:r>
+                      <a:endParaRPr lang="en-US" sz="1300" dirty="0"/>
+                    </a:p>
+                  </a:txBody>
+                  <a:tcPr marL="84947" marR="84947" marT="42474" marB="42474"/>
+                </a:tc>
+                <a:tc>
+                  <a:txBody>
+                    <a:bodyPr/>
+                    <a:lstStyle/>
+                    <a:p>
+                      <a:r>
+                        <a:rPr lang="en-US" sz="1300" dirty="0" smtClean="0"/>
+                        <a:t>N</a:t>
+                      </a:r>
+                      <a:endParaRPr lang="en-US" sz="1300" dirty="0"/>
+                    </a:p>
+                  </a:txBody>
+                  <a:tcPr marL="84947" marR="84947" marT="42474" marB="42474"/>
+                </a:tc>
+              </a:tr>
+              <a:tr h="283157">
+                <a:tc>
+                  <a:txBody>
+                    <a:bodyPr/>
+                    <a:lstStyle/>
+                    <a:p>
+                      <a:r>
+                        <a:rPr lang="en-US" sz="1300" dirty="0" smtClean="0"/>
+                        <a:t>Pensioner over 60s</a:t>
+                      </a:r>
+                      <a:endParaRPr lang="en-US" sz="1300" dirty="0"/>
+                    </a:p>
+                  </a:txBody>
+                  <a:tcPr marL="84947" marR="84947" marT="42474" marB="42474"/>
+                </a:tc>
+                <a:tc>
+                  <a:txBody>
+                    <a:bodyPr/>
+                    <a:lstStyle/>
+                    <a:p>
+                      <a:r>
+                        <a:rPr lang="en-US" sz="1300" dirty="0" smtClean="0"/>
+                        <a:t>Y/N</a:t>
+                      </a:r>
+                      <a:endParaRPr lang="en-US" sz="1300" dirty="0"/>
+                    </a:p>
+                  </a:txBody>
+                  <a:tcPr marL="84947" marR="84947" marT="42474" marB="42474"/>
+                </a:tc>
+                <a:tc>
+                  <a:txBody>
+                    <a:bodyPr/>
+                    <a:lstStyle/>
+                    <a:p>
+                      <a:r>
+                        <a:rPr lang="en-US" sz="1300" dirty="0" smtClean="0"/>
+                        <a:t>Y/N</a:t>
+                      </a:r>
+                      <a:endParaRPr lang="en-US" sz="1300" dirty="0"/>
+                    </a:p>
+                  </a:txBody>
+                  <a:tcPr marL="84947" marR="84947" marT="42474" marB="42474"/>
+                </a:tc>
+                <a:tc>
+                  <a:txBody>
+                    <a:bodyPr/>
+                    <a:lstStyle/>
+                    <a:p>
+                      <a:r>
+                        <a:rPr lang="en-US" sz="1300" dirty="0" smtClean="0"/>
+                        <a:t>Y</a:t>
+                      </a:r>
+                      <a:endParaRPr lang="en-US" sz="1300" dirty="0"/>
+                    </a:p>
+                  </a:txBody>
+                  <a:tcPr marL="84947" marR="84947" marT="42474" marB="42474"/>
+                </a:tc>
+                <a:tc>
+                  <a:txBody>
+                    <a:bodyPr/>
+                    <a:lstStyle/>
+                    <a:p>
+                      <a:r>
+                        <a:rPr lang="en-US" sz="1300" dirty="0" smtClean="0"/>
+                        <a:t>Y</a:t>
+                      </a:r>
+                      <a:endParaRPr lang="en-US" sz="1300" dirty="0"/>
+                    </a:p>
+                  </a:txBody>
+                  <a:tcPr marL="84947" marR="84947" marT="42474" marB="42474"/>
+                </a:tc>
+                <a:tc>
+                  <a:txBody>
+                    <a:bodyPr/>
+                    <a:lstStyle/>
+                    <a:p>
+                      <a:r>
+                        <a:rPr lang="en-US" sz="1300" dirty="0" smtClean="0"/>
+                        <a:t>N</a:t>
+                      </a:r>
+                      <a:endParaRPr lang="en-US" sz="1300" dirty="0"/>
+                    </a:p>
+                  </a:txBody>
+                  <a:tcPr marL="84947" marR="84947" marT="42474" marB="42474"/>
+                </a:tc>
+                <a:tc>
+                  <a:txBody>
+                    <a:bodyPr/>
+                    <a:lstStyle/>
+                    <a:p>
+                      <a:r>
+                        <a:rPr lang="en-US" sz="1300" dirty="0" smtClean="0"/>
+                        <a:t>N</a:t>
+                      </a:r>
+                      <a:endParaRPr lang="en-US" sz="1300" dirty="0"/>
+                    </a:p>
+                  </a:txBody>
+                  <a:tcPr marL="84947" marR="84947" marT="42474" marB="42474"/>
+                </a:tc>
+              </a:tr>
+              <a:tr h="481368">
+                <a:tc>
+                  <a:txBody>
+                    <a:bodyPr/>
+                    <a:lstStyle/>
+                    <a:p>
+                      <a:r>
+                        <a:rPr lang="en-US" sz="1300" baseline="0" dirty="0" smtClean="0"/>
+                        <a:t>Multiply buying card during 6 month </a:t>
+                      </a:r>
+                      <a:endParaRPr lang="en-US" sz="1300" dirty="0"/>
+                    </a:p>
+                  </a:txBody>
+                  <a:tcPr marL="84947" marR="84947" marT="42474" marB="42474"/>
+                </a:tc>
+                <a:tc>
+                  <a:txBody>
+                    <a:bodyPr/>
+                    <a:lstStyle/>
+                    <a:p>
+                      <a:r>
+                        <a:rPr lang="en-US" sz="1300" dirty="0" smtClean="0"/>
+                        <a:t>Y</a:t>
+                      </a:r>
+                      <a:endParaRPr lang="en-US" sz="1300" dirty="0"/>
+                    </a:p>
+                  </a:txBody>
+                  <a:tcPr marL="84947" marR="84947" marT="42474" marB="42474"/>
+                </a:tc>
+                <a:tc>
+                  <a:txBody>
+                    <a:bodyPr/>
+                    <a:lstStyle/>
+                    <a:p>
+                      <a:r>
+                        <a:rPr lang="en-US" sz="1300" dirty="0" smtClean="0"/>
+                        <a:t>N</a:t>
+                      </a:r>
+                      <a:endParaRPr lang="en-US" sz="1300" dirty="0"/>
+                    </a:p>
+                  </a:txBody>
+                  <a:tcPr marL="84947" marR="84947" marT="42474" marB="42474"/>
+                </a:tc>
+                <a:tc>
+                  <a:txBody>
+                    <a:bodyPr/>
+                    <a:lstStyle/>
+                    <a:p>
+                      <a:r>
+                        <a:rPr lang="en-US" sz="1300" dirty="0" smtClean="0"/>
+                        <a:t>Y</a:t>
+                      </a:r>
+                      <a:endParaRPr lang="en-US" sz="1300" dirty="0"/>
+                    </a:p>
+                  </a:txBody>
+                  <a:tcPr marL="84947" marR="84947" marT="42474" marB="42474"/>
+                </a:tc>
+                <a:tc>
+                  <a:txBody>
+                    <a:bodyPr/>
+                    <a:lstStyle/>
+                    <a:p>
+                      <a:r>
+                        <a:rPr lang="en-US" sz="1300" dirty="0" smtClean="0"/>
+                        <a:t>N</a:t>
+                      </a:r>
+                      <a:endParaRPr lang="en-US" sz="1300" dirty="0"/>
+                    </a:p>
+                  </a:txBody>
+                  <a:tcPr marL="84947" marR="84947" marT="42474" marB="42474"/>
+                </a:tc>
+                <a:tc>
+                  <a:txBody>
+                    <a:bodyPr/>
+                    <a:lstStyle/>
+                    <a:p>
+                      <a:r>
+                        <a:rPr lang="en-US" sz="1300" dirty="0" smtClean="0"/>
+                        <a:t>Y</a:t>
+                      </a:r>
+                      <a:endParaRPr lang="en-US" sz="1300" dirty="0"/>
+                    </a:p>
+                  </a:txBody>
+                  <a:tcPr marL="84947" marR="84947" marT="42474" marB="42474"/>
+                </a:tc>
+                <a:tc>
+                  <a:txBody>
+                    <a:bodyPr/>
+                    <a:lstStyle/>
+                    <a:p>
+                      <a:r>
+                        <a:rPr lang="en-US" sz="1300" dirty="0" smtClean="0"/>
+                        <a:t>N</a:t>
+                      </a:r>
+                      <a:endParaRPr lang="en-US" sz="1300" dirty="0"/>
+                    </a:p>
+                  </a:txBody>
+                  <a:tcPr marL="84947" marR="84947" marT="42474" marB="42474"/>
+                </a:tc>
+              </a:tr>
+              <a:tr h="283157">
+                <a:tc gridSpan="7">
+                  <a:txBody>
+                    <a:bodyPr/>
+                    <a:lstStyle/>
+                    <a:p>
+                      <a:pPr algn="ctr"/>
+                      <a:r>
+                        <a:rPr lang="en-US" sz="1300" dirty="0" smtClean="0"/>
+                        <a:t>Effects (outputs)</a:t>
+                      </a:r>
+                      <a:endParaRPr lang="en-US" sz="1300" dirty="0"/>
+                    </a:p>
+                  </a:txBody>
+                  <a:tcPr marL="84947" marR="84947" marT="42474" marB="42474"/>
+                </a:tc>
+                <a:tc hMerge="1">
+                  <a:txBody>
+                    <a:bodyPr/>
+                    <a:lstStyle/>
+                    <a:p>
+                      <a:endParaRPr lang="en-US"/>
+                    </a:p>
+                  </a:txBody>
+                  <a:tcPr/>
+                </a:tc>
+                <a:tc hMerge="1">
+                  <a:txBody>
+                    <a:bodyPr/>
+                    <a:lstStyle/>
+                    <a:p>
+                      <a:endParaRPr lang="en-US"/>
+                    </a:p>
+                  </a:txBody>
+                  <a:tcPr/>
+                </a:tc>
+                <a:tc hMerge="1">
+                  <a:txBody>
+                    <a:bodyPr/>
+                    <a:lstStyle/>
+                    <a:p>
+                      <a:endParaRPr lang="en-US"/>
+                    </a:p>
+                  </a:txBody>
+                  <a:tcPr/>
+                </a:tc>
+                <a:tc hMerge="1">
+                  <a:txBody>
+                    <a:bodyPr/>
+                    <a:lstStyle/>
+                    <a:p>
+                      <a:endParaRPr lang="en-US"/>
+                    </a:p>
+                  </a:txBody>
+                  <a:tcPr/>
+                </a:tc>
+                <a:tc hMerge="1">
+                  <a:txBody>
+                    <a:bodyPr/>
+                    <a:lstStyle/>
+                    <a:p>
+                      <a:endParaRPr lang="en-US"/>
+                    </a:p>
+                  </a:txBody>
+                  <a:tcPr/>
+                </a:tc>
+                <a:tc hMerge="1">
+                  <a:txBody>
+                    <a:bodyPr/>
+                    <a:lstStyle/>
+                    <a:p>
+                      <a:endParaRPr lang="en-US" dirty="0"/>
+                    </a:p>
+                  </a:txBody>
+                  <a:tcPr/>
+                </a:tc>
+              </a:tr>
+              <a:tr h="283157">
+                <a:tc>
+                  <a:txBody>
+                    <a:bodyPr/>
+                    <a:lstStyle/>
+                    <a:p>
+                      <a:r>
+                        <a:rPr lang="en-US" sz="1300" dirty="0" smtClean="0"/>
+                        <a:t>Discount</a:t>
+                      </a:r>
+                      <a:endParaRPr lang="en-US" sz="1300" dirty="0"/>
+                    </a:p>
+                  </a:txBody>
+                  <a:tcPr marL="84947" marR="84947" marT="42474" marB="42474"/>
+                </a:tc>
+                <a:tc>
+                  <a:txBody>
+                    <a:bodyPr/>
+                    <a:lstStyle/>
+                    <a:p>
+                      <a:r>
+                        <a:rPr lang="en-US" sz="1300" dirty="0" smtClean="0"/>
+                        <a:t>25</a:t>
+                      </a:r>
+                      <a:endParaRPr lang="en-US" sz="1300" dirty="0"/>
+                    </a:p>
+                  </a:txBody>
+                  <a:tcPr marL="84947" marR="84947" marT="42474" marB="42474"/>
+                </a:tc>
+                <a:tc>
+                  <a:txBody>
+                    <a:bodyPr/>
+                    <a:lstStyle/>
+                    <a:p>
+                      <a:r>
+                        <a:rPr lang="en-US" sz="1300" dirty="0" smtClean="0"/>
+                        <a:t>20</a:t>
+                      </a:r>
+                      <a:endParaRPr lang="en-US" sz="1300" dirty="0"/>
+                    </a:p>
+                  </a:txBody>
+                  <a:tcPr marL="84947" marR="84947" marT="42474" marB="42474"/>
+                </a:tc>
+                <a:tc>
+                  <a:txBody>
+                    <a:bodyPr/>
+                    <a:lstStyle/>
+                    <a:p>
+                      <a:r>
+                        <a:rPr lang="en-US" sz="1300" dirty="0" smtClean="0"/>
+                        <a:t>15</a:t>
+                      </a:r>
+                      <a:endParaRPr lang="en-US" sz="1300" dirty="0"/>
+                    </a:p>
+                  </a:txBody>
+                  <a:tcPr marL="84947" marR="84947" marT="42474" marB="42474"/>
+                </a:tc>
+                <a:tc>
+                  <a:txBody>
+                    <a:bodyPr/>
+                    <a:lstStyle/>
+                    <a:p>
+                      <a:r>
+                        <a:rPr lang="en-US" sz="1300" dirty="0" smtClean="0"/>
+                        <a:t>10</a:t>
+                      </a:r>
+                      <a:endParaRPr lang="en-US" sz="1300" dirty="0"/>
+                    </a:p>
+                  </a:txBody>
+                  <a:tcPr marL="84947" marR="84947" marT="42474" marB="42474"/>
+                </a:tc>
+                <a:tc>
+                  <a:txBody>
+                    <a:bodyPr/>
+                    <a:lstStyle/>
+                    <a:p>
+                      <a:r>
+                        <a:rPr lang="en-US" sz="1300" dirty="0" smtClean="0"/>
+                        <a:t>5</a:t>
+                      </a:r>
+                      <a:endParaRPr lang="en-US" sz="1300" dirty="0"/>
+                    </a:p>
+                  </a:txBody>
+                  <a:tcPr marL="84947" marR="84947" marT="42474" marB="42474"/>
+                </a:tc>
+                <a:tc>
+                  <a:txBody>
+                    <a:bodyPr/>
+                    <a:lstStyle/>
+                    <a:p>
+                      <a:r>
+                        <a:rPr lang="en-US" sz="1300" dirty="0" smtClean="0"/>
+                        <a:t>0</a:t>
+                      </a:r>
+                      <a:endParaRPr lang="en-US" sz="1300" dirty="0"/>
+                    </a:p>
+                  </a:txBody>
+                  <a:tcPr marL="84947" marR="84947" marT="42474" marB="42474"/>
+                </a:tc>
+              </a:tr>
+              <a:tr h="283157">
+                <a:tc>
+                  <a:txBody>
+                    <a:bodyPr/>
+                    <a:lstStyle/>
+                    <a:p>
+                      <a:r>
+                        <a:rPr lang="en-US" sz="1300" dirty="0" smtClean="0"/>
+                        <a:t>Message*</a:t>
+                      </a:r>
+                      <a:endParaRPr lang="en-US" sz="1300" dirty="0"/>
+                    </a:p>
+                  </a:txBody>
+                  <a:tcPr marL="84947" marR="84947" marT="42474" marB="42474"/>
+                </a:tc>
+                <a:tc>
+                  <a:txBody>
+                    <a:bodyPr/>
+                    <a:lstStyle/>
+                    <a:p>
+                      <a:r>
+                        <a:rPr lang="en-US" sz="1300" dirty="0" smtClean="0"/>
+                        <a:t>+ </a:t>
+                      </a:r>
+                      <a:endParaRPr lang="en-US" sz="1300" dirty="0"/>
+                    </a:p>
+                  </a:txBody>
+                  <a:tcPr marL="84947" marR="84947" marT="42474" marB="42474"/>
+                </a:tc>
+                <a:tc>
+                  <a:txBody>
+                    <a:bodyPr/>
+                    <a:lstStyle/>
+                    <a:p>
+                      <a:r>
+                        <a:rPr lang="en-US" sz="1300" dirty="0" smtClean="0"/>
+                        <a:t>+</a:t>
+                      </a:r>
+                      <a:endParaRPr lang="en-US" sz="1300" dirty="0"/>
+                    </a:p>
+                  </a:txBody>
+                  <a:tcPr marL="84947" marR="84947" marT="42474" marB="42474"/>
+                </a:tc>
+                <a:tc>
+                  <a:txBody>
+                    <a:bodyPr/>
+                    <a:lstStyle/>
+                    <a:p>
+                      <a:endParaRPr lang="en-US" sz="1300" dirty="0"/>
+                    </a:p>
+                  </a:txBody>
+                  <a:tcPr marL="84947" marR="84947" marT="42474" marB="42474"/>
+                </a:tc>
+                <a:tc>
+                  <a:txBody>
+                    <a:bodyPr/>
+                    <a:lstStyle/>
+                    <a:p>
+                      <a:endParaRPr lang="en-US" sz="1300"/>
+                    </a:p>
+                  </a:txBody>
+                  <a:tcPr marL="84947" marR="84947" marT="42474" marB="42474"/>
+                </a:tc>
+                <a:tc>
+                  <a:txBody>
+                    <a:bodyPr/>
+                    <a:lstStyle/>
+                    <a:p>
+                      <a:endParaRPr lang="en-US" sz="1300" dirty="0"/>
+                    </a:p>
+                  </a:txBody>
+                  <a:tcPr marL="84947" marR="84947" marT="42474" marB="42474"/>
+                </a:tc>
+                <a:tc>
+                  <a:txBody>
+                    <a:bodyPr/>
+                    <a:lstStyle/>
+                    <a:p>
+                      <a:endParaRPr lang="en-US" sz="1300" dirty="0"/>
+                    </a:p>
+                  </a:txBody>
+                  <a:tcPr marL="84947" marR="84947" marT="42474" marB="42474"/>
+                </a:tc>
+              </a:tr>
+            </a:tbl>
+          </a:graphicData>
+        </a:graphic>
+      </p:graphicFrame>
+      <p:graphicFrame>
+        <p:nvGraphicFramePr>
+          <p:cNvPr id="9" name="Table 8"/>
+          <p:cNvGraphicFramePr>
+            <a:graphicFrameLocks noGrp="1"/>
+          </p:cNvGraphicFramePr>
+          <p:nvPr>
+            <p:extLst>
+              <p:ext uri="{D42A27DB-BD31-4B8C-83A1-F6EECF244321}">
+                <p14:modId xmlns:p14="http://schemas.microsoft.com/office/powerpoint/2010/main" val="303781174"/>
+              </p:ext>
+            </p:extLst>
+          </p:nvPr>
+        </p:nvGraphicFramePr>
+        <p:xfrm>
+          <a:off x="838201" y="3527573"/>
+          <a:ext cx="9874386" cy="3098607"/>
+        </p:xfrm>
+        <a:graphic>
+          <a:graphicData uri="http://schemas.openxmlformats.org/drawingml/2006/table">
+            <a:tbl>
+              <a:tblPr firstRow="1" bandRow="1">
+                <a:tableStyleId>{5C22544A-7EE6-4342-B048-85BDC9FD1C3A}</a:tableStyleId>
+              </a:tblPr>
+              <a:tblGrid>
+                <a:gridCol w="358916"/>
+                <a:gridCol w="3920659"/>
+                <a:gridCol w="5594811"/>
+              </a:tblGrid>
+              <a:tr h="349139">
+                <a:tc>
+                  <a:txBody>
+                    <a:bodyPr/>
+                    <a:lstStyle/>
+                    <a:p>
+                      <a:r>
+                        <a:rPr lang="en-US" sz="1700" dirty="0" smtClean="0"/>
+                        <a:t>#</a:t>
+                      </a:r>
+                      <a:endParaRPr lang="en-US" sz="1700" dirty="0"/>
+                    </a:p>
+                  </a:txBody>
+                  <a:tcPr marL="87285" marR="87285" marT="43642" marB="43642"/>
+                </a:tc>
+                <a:tc>
+                  <a:txBody>
+                    <a:bodyPr/>
+                    <a:lstStyle/>
+                    <a:p>
+                      <a:r>
+                        <a:rPr lang="en-US" sz="1700" dirty="0" smtClean="0"/>
+                        <a:t>Decision</a:t>
+                      </a:r>
+                      <a:endParaRPr lang="en-US" sz="1700" dirty="0"/>
+                    </a:p>
+                  </a:txBody>
+                  <a:tcPr marL="87285" marR="87285" marT="43642" marB="43642"/>
+                </a:tc>
+                <a:tc>
+                  <a:txBody>
+                    <a:bodyPr/>
+                    <a:lstStyle/>
+                    <a:p>
+                      <a:r>
+                        <a:rPr lang="en-US" sz="1700" dirty="0" smtClean="0"/>
+                        <a:t>Outcome</a:t>
+                      </a:r>
+                      <a:endParaRPr lang="en-US" sz="1700" dirty="0"/>
+                    </a:p>
+                  </a:txBody>
+                  <a:tcPr marL="87285" marR="87285" marT="43642" marB="43642"/>
+                </a:tc>
+              </a:tr>
+              <a:tr h="698278">
+                <a:tc>
+                  <a:txBody>
+                    <a:bodyPr/>
+                    <a:lstStyle/>
+                    <a:p>
+                      <a:r>
+                        <a:rPr lang="en-US" sz="1300" dirty="0" smtClean="0"/>
+                        <a:t>1</a:t>
+                      </a:r>
+                      <a:endParaRPr lang="en-US" sz="1300" dirty="0"/>
+                    </a:p>
+                  </a:txBody>
+                  <a:tcPr marL="87285" marR="87285" marT="43642" marB="43642"/>
+                </a:tc>
+                <a:tc>
+                  <a:txBody>
+                    <a:bodyPr/>
+                    <a:lstStyle/>
+                    <a:p>
+                      <a:r>
+                        <a:rPr lang="en-US" sz="1300" dirty="0" smtClean="0"/>
+                        <a:t>If a</a:t>
+                      </a:r>
+                      <a:r>
+                        <a:rPr lang="en-US" sz="1300" baseline="0" dirty="0" smtClean="0"/>
+                        <a:t> person is a student and pensioner (or not pensioner) and buying card again during  6 month. He chooses more </a:t>
+                      </a:r>
+                      <a:r>
+                        <a:rPr lang="en-US" sz="1300" dirty="0" smtClean="0">
+                          <a:effectLst/>
+                        </a:rPr>
+                        <a:t>more advantageous</a:t>
+                      </a:r>
+                      <a:r>
+                        <a:rPr lang="ru-RU" sz="1300" baseline="0" dirty="0" smtClean="0">
+                          <a:effectLst/>
+                        </a:rPr>
+                        <a:t> </a:t>
+                      </a:r>
+                      <a:r>
+                        <a:rPr lang="en-US" sz="1300" baseline="0" dirty="0" smtClean="0">
+                          <a:effectLst/>
+                        </a:rPr>
+                        <a:t>option </a:t>
+                      </a:r>
+                      <a:endParaRPr lang="en-US" sz="1300" dirty="0" smtClean="0">
+                        <a:effectLst/>
+                      </a:endParaRPr>
+                    </a:p>
+                  </a:txBody>
+                  <a:tcPr marL="87285" marR="87285" marT="43642" marB="43642"/>
+                </a:tc>
+                <a:tc>
+                  <a:txBody>
+                    <a:bodyPr/>
+                    <a:lstStyle/>
+                    <a:p>
+                      <a:r>
+                        <a:rPr lang="en-US" sz="1300" dirty="0" smtClean="0"/>
+                        <a:t>25% discount will be given for the travel card </a:t>
+                      </a:r>
+                      <a:endParaRPr lang="en-US" sz="1300" dirty="0"/>
+                    </a:p>
+                  </a:txBody>
+                  <a:tcPr marL="87285" marR="87285" marT="43642" marB="43642"/>
+                </a:tc>
+              </a:tr>
+              <a:tr h="494613">
+                <a:tc>
+                  <a:txBody>
+                    <a:bodyPr/>
+                    <a:lstStyle/>
+                    <a:p>
+                      <a:r>
+                        <a:rPr lang="en-US" sz="1300" dirty="0" smtClean="0"/>
+                        <a:t>2</a:t>
+                      </a:r>
+                      <a:endParaRPr lang="en-US" sz="1300" dirty="0"/>
+                    </a:p>
+                  </a:txBody>
+                  <a:tcPr marL="87285" marR="87285" marT="43642" marB="43642"/>
+                </a:tc>
+                <a:tc>
+                  <a:txBody>
+                    <a:bodyPr/>
+                    <a:lstStyle/>
+                    <a:p>
+                      <a:pPr marL="0" marR="0" indent="0" algn="l" defTabSz="914400" rtl="0" eaLnBrk="1" fontAlgn="auto" latinLnBrk="0" hangingPunct="1">
+                        <a:lnSpc>
+                          <a:spcPct val="100000"/>
+                        </a:lnSpc>
+                        <a:spcBef>
+                          <a:spcPts val="0"/>
+                        </a:spcBef>
+                        <a:spcAft>
+                          <a:spcPts val="0"/>
+                        </a:spcAft>
+                        <a:buClrTx/>
+                        <a:buSzTx/>
+                        <a:buFontTx/>
+                        <a:buNone/>
+                        <a:tabLst/>
+                        <a:defRPr/>
+                      </a:pPr>
+                      <a:r>
+                        <a:rPr lang="en-US" sz="1300" dirty="0" smtClean="0"/>
+                        <a:t>A</a:t>
+                      </a:r>
+                      <a:r>
+                        <a:rPr lang="en-US" sz="1300" baseline="0" dirty="0" smtClean="0"/>
+                        <a:t> person is a student and pensioner or just a student. He chooses more </a:t>
+                      </a:r>
+                      <a:r>
+                        <a:rPr lang="en-US" sz="1300" dirty="0" smtClean="0">
+                          <a:effectLst/>
+                        </a:rPr>
+                        <a:t>more advantageous</a:t>
+                      </a:r>
+                      <a:r>
+                        <a:rPr lang="ru-RU" sz="1300" baseline="0" dirty="0" smtClean="0">
+                          <a:effectLst/>
+                        </a:rPr>
+                        <a:t> </a:t>
+                      </a:r>
+                      <a:r>
+                        <a:rPr lang="en-US" sz="1300" baseline="0" dirty="0" smtClean="0">
+                          <a:effectLst/>
+                        </a:rPr>
+                        <a:t>option.</a:t>
+                      </a:r>
+                      <a:endParaRPr lang="en-US" sz="1300" dirty="0" smtClean="0">
+                        <a:effectLst/>
+                      </a:endParaRPr>
+                    </a:p>
+                  </a:txBody>
+                  <a:tcPr marL="87285" marR="87285" marT="43642" marB="43642"/>
+                </a:tc>
+                <a:tc>
+                  <a:txBody>
+                    <a:bodyPr/>
+                    <a:lstStyle/>
+                    <a:p>
+                      <a:pPr marL="0" marR="0" indent="0" algn="l" defTabSz="914400" rtl="0" eaLnBrk="1" fontAlgn="auto" latinLnBrk="0" hangingPunct="1">
+                        <a:lnSpc>
+                          <a:spcPct val="100000"/>
+                        </a:lnSpc>
+                        <a:spcBef>
+                          <a:spcPts val="0"/>
+                        </a:spcBef>
+                        <a:spcAft>
+                          <a:spcPts val="0"/>
+                        </a:spcAft>
+                        <a:buClrTx/>
+                        <a:buSzTx/>
+                        <a:buFontTx/>
+                        <a:buNone/>
+                        <a:tabLst/>
+                        <a:defRPr/>
+                      </a:pPr>
+                      <a:r>
+                        <a:rPr lang="en-US" sz="1300" dirty="0" smtClean="0"/>
+                        <a:t>20% discount will be given for the travel card</a:t>
+                      </a:r>
+                    </a:p>
+                  </a:txBody>
+                  <a:tcPr marL="87285" marR="87285" marT="43642" marB="43642"/>
+                </a:tc>
+              </a:tr>
+              <a:tr h="494613">
+                <a:tc>
+                  <a:txBody>
+                    <a:bodyPr/>
+                    <a:lstStyle/>
+                    <a:p>
+                      <a:r>
+                        <a:rPr lang="en-US" sz="1300" dirty="0" smtClean="0"/>
+                        <a:t>3</a:t>
+                      </a:r>
+                      <a:endParaRPr lang="en-US" sz="1300" dirty="0"/>
+                    </a:p>
+                  </a:txBody>
+                  <a:tcPr marL="87285" marR="87285" marT="43642" marB="43642"/>
+                </a:tc>
+                <a:tc>
+                  <a:txBody>
+                    <a:bodyPr/>
+                    <a:lstStyle/>
+                    <a:p>
+                      <a:pPr marL="0" marR="0" indent="0" algn="l" defTabSz="914400" rtl="0" eaLnBrk="1" fontAlgn="auto" latinLnBrk="0" hangingPunct="1">
+                        <a:lnSpc>
+                          <a:spcPct val="100000"/>
+                        </a:lnSpc>
+                        <a:spcBef>
+                          <a:spcPts val="0"/>
+                        </a:spcBef>
+                        <a:spcAft>
+                          <a:spcPts val="0"/>
+                        </a:spcAft>
+                        <a:buClrTx/>
+                        <a:buSzTx/>
+                        <a:buFontTx/>
+                        <a:buNone/>
+                        <a:tabLst/>
+                        <a:defRPr/>
+                      </a:pPr>
+                      <a:r>
+                        <a:rPr lang="en-US" sz="1300" dirty="0" smtClean="0"/>
+                        <a:t>A</a:t>
+                      </a:r>
+                      <a:r>
+                        <a:rPr lang="en-US" sz="1300" baseline="0" dirty="0" smtClean="0"/>
+                        <a:t> person is a pensioner and buying card again during  6 month</a:t>
+                      </a:r>
+                      <a:endParaRPr lang="en-US" sz="1300" dirty="0" smtClean="0"/>
+                    </a:p>
+                  </a:txBody>
+                  <a:tcPr marL="87285" marR="87285" marT="43642" marB="43642"/>
+                </a:tc>
+                <a:tc>
+                  <a:txBody>
+                    <a:bodyPr/>
+                    <a:lstStyle/>
+                    <a:p>
+                      <a:pPr marL="0" marR="0" indent="0" algn="l" defTabSz="914400" rtl="0" eaLnBrk="1" fontAlgn="auto" latinLnBrk="0" hangingPunct="1">
+                        <a:lnSpc>
+                          <a:spcPct val="100000"/>
+                        </a:lnSpc>
+                        <a:spcBef>
+                          <a:spcPts val="0"/>
+                        </a:spcBef>
+                        <a:spcAft>
+                          <a:spcPts val="0"/>
+                        </a:spcAft>
+                        <a:buClrTx/>
+                        <a:buSzTx/>
+                        <a:buFontTx/>
+                        <a:buNone/>
+                        <a:tabLst/>
+                        <a:defRPr/>
+                      </a:pPr>
+                      <a:r>
+                        <a:rPr lang="en-US" sz="1300" baseline="0" dirty="0" smtClean="0"/>
+                        <a:t>15 </a:t>
+                      </a:r>
+                      <a:r>
+                        <a:rPr lang="en-US" sz="1300" dirty="0" smtClean="0"/>
+                        <a:t>% discount will be given for the travel card</a:t>
+                      </a:r>
+                    </a:p>
+                  </a:txBody>
+                  <a:tcPr marL="87285" marR="87285" marT="43642" marB="43642"/>
+                </a:tc>
+              </a:tr>
+              <a:tr h="353988">
+                <a:tc>
+                  <a:txBody>
+                    <a:bodyPr/>
+                    <a:lstStyle/>
+                    <a:p>
+                      <a:r>
+                        <a:rPr lang="en-US" sz="1300" dirty="0" smtClean="0"/>
+                        <a:t>4</a:t>
+                      </a:r>
+                      <a:endParaRPr lang="en-US" sz="1300" dirty="0"/>
+                    </a:p>
+                  </a:txBody>
+                  <a:tcPr marL="87285" marR="87285" marT="43642" marB="43642"/>
+                </a:tc>
+                <a:tc>
+                  <a:txBody>
+                    <a:bodyPr/>
+                    <a:lstStyle/>
+                    <a:p>
+                      <a:pPr marL="0" marR="0" indent="0" algn="l" defTabSz="914400" rtl="0" eaLnBrk="1" fontAlgn="auto" latinLnBrk="0" hangingPunct="1">
+                        <a:lnSpc>
+                          <a:spcPct val="100000"/>
+                        </a:lnSpc>
+                        <a:spcBef>
+                          <a:spcPts val="0"/>
+                        </a:spcBef>
+                        <a:spcAft>
+                          <a:spcPts val="0"/>
+                        </a:spcAft>
+                        <a:buClrTx/>
+                        <a:buSzTx/>
+                        <a:buFontTx/>
+                        <a:buNone/>
+                        <a:tabLst/>
+                        <a:defRPr/>
+                      </a:pPr>
+                      <a:r>
+                        <a:rPr lang="en-US" sz="1300" dirty="0" smtClean="0"/>
+                        <a:t>A</a:t>
+                      </a:r>
+                      <a:r>
+                        <a:rPr lang="en-US" sz="1300" baseline="0" dirty="0" smtClean="0"/>
+                        <a:t> person is a pensioner</a:t>
+                      </a:r>
+                      <a:endParaRPr lang="en-US" sz="1300" dirty="0" smtClean="0"/>
+                    </a:p>
+                  </a:txBody>
+                  <a:tcPr marL="87285" marR="87285" marT="43642" marB="43642"/>
+                </a:tc>
+                <a:tc>
+                  <a:txBody>
+                    <a:bodyPr/>
+                    <a:lstStyle/>
+                    <a:p>
+                      <a:pPr marL="0" marR="0" indent="0" algn="l" defTabSz="914400" rtl="0" eaLnBrk="1" fontAlgn="auto" latinLnBrk="0" hangingPunct="1">
+                        <a:lnSpc>
+                          <a:spcPct val="100000"/>
+                        </a:lnSpc>
+                        <a:spcBef>
+                          <a:spcPts val="0"/>
+                        </a:spcBef>
+                        <a:spcAft>
+                          <a:spcPts val="0"/>
+                        </a:spcAft>
+                        <a:buClrTx/>
+                        <a:buSzTx/>
+                        <a:buFontTx/>
+                        <a:buNone/>
+                        <a:tabLst/>
+                        <a:defRPr/>
+                      </a:pPr>
+                      <a:r>
+                        <a:rPr lang="en-US" sz="1300" baseline="0" dirty="0" smtClean="0"/>
+                        <a:t>10 </a:t>
+                      </a:r>
+                      <a:r>
+                        <a:rPr lang="en-US" sz="1300" dirty="0" smtClean="0"/>
+                        <a:t>% discount will be given for the travel card</a:t>
+                      </a:r>
+                    </a:p>
+                  </a:txBody>
+                  <a:tcPr marL="87285" marR="87285" marT="43642" marB="43642"/>
+                </a:tc>
+              </a:tr>
+              <a:tr h="353988">
+                <a:tc>
+                  <a:txBody>
+                    <a:bodyPr/>
+                    <a:lstStyle/>
+                    <a:p>
+                      <a:r>
+                        <a:rPr lang="en-US" sz="1300" dirty="0" smtClean="0"/>
+                        <a:t>5</a:t>
+                      </a:r>
+                      <a:endParaRPr lang="en-US" sz="1300" dirty="0"/>
+                    </a:p>
+                  </a:txBody>
+                  <a:tcPr marL="87285" marR="87285" marT="43642" marB="43642"/>
+                </a:tc>
+                <a:tc>
+                  <a:txBody>
+                    <a:bodyPr/>
+                    <a:lstStyle/>
+                    <a:p>
+                      <a:pPr marL="0" marR="0" indent="0" algn="l" defTabSz="914400" rtl="0" eaLnBrk="1" fontAlgn="auto" latinLnBrk="0" hangingPunct="1">
+                        <a:lnSpc>
+                          <a:spcPct val="100000"/>
+                        </a:lnSpc>
+                        <a:spcBef>
+                          <a:spcPts val="0"/>
+                        </a:spcBef>
+                        <a:spcAft>
+                          <a:spcPts val="0"/>
+                        </a:spcAft>
+                        <a:buClrTx/>
+                        <a:buSzTx/>
+                        <a:buFontTx/>
+                        <a:buNone/>
+                        <a:tabLst/>
+                        <a:defRPr/>
+                      </a:pPr>
+                      <a:r>
+                        <a:rPr lang="en-US" sz="1300" dirty="0" smtClean="0"/>
+                        <a:t>A person buying travel card again during last 6 month</a:t>
+                      </a:r>
+                    </a:p>
+                  </a:txBody>
+                  <a:tcPr marL="87285" marR="87285" marT="43642" marB="43642"/>
+                </a:tc>
+                <a:tc>
+                  <a:txBody>
+                    <a:bodyPr/>
+                    <a:lstStyle/>
+                    <a:p>
+                      <a:pPr marL="0" marR="0" indent="0" algn="l" defTabSz="914400" rtl="0" eaLnBrk="1" fontAlgn="auto" latinLnBrk="0" hangingPunct="1">
+                        <a:lnSpc>
+                          <a:spcPct val="100000"/>
+                        </a:lnSpc>
+                        <a:spcBef>
+                          <a:spcPts val="0"/>
+                        </a:spcBef>
+                        <a:spcAft>
+                          <a:spcPts val="0"/>
+                        </a:spcAft>
+                        <a:buClrTx/>
+                        <a:buSzTx/>
+                        <a:buFontTx/>
+                        <a:buNone/>
+                        <a:tabLst/>
+                        <a:defRPr/>
+                      </a:pPr>
+                      <a:r>
+                        <a:rPr lang="en-US" sz="1300" baseline="0" dirty="0" smtClean="0"/>
+                        <a:t>5 </a:t>
+                      </a:r>
+                      <a:r>
+                        <a:rPr lang="en-US" sz="1300" dirty="0" smtClean="0"/>
+                        <a:t>% discount will be given for the travel card</a:t>
+                      </a:r>
+                    </a:p>
+                  </a:txBody>
+                  <a:tcPr marL="87285" marR="87285" marT="43642" marB="43642"/>
+                </a:tc>
+              </a:tr>
+              <a:tr h="353988">
+                <a:tc>
+                  <a:txBody>
+                    <a:bodyPr/>
+                    <a:lstStyle/>
+                    <a:p>
+                      <a:r>
+                        <a:rPr lang="en-US" sz="1300" dirty="0" smtClean="0"/>
+                        <a:t>6</a:t>
+                      </a:r>
+                      <a:endParaRPr lang="en-US" sz="1300" dirty="0"/>
+                    </a:p>
+                  </a:txBody>
+                  <a:tcPr marL="87285" marR="87285" marT="43642" marB="43642"/>
+                </a:tc>
+                <a:tc>
+                  <a:txBody>
+                    <a:bodyPr/>
+                    <a:lstStyle/>
+                    <a:p>
+                      <a:pPr marL="0" marR="0" indent="0" algn="l" defTabSz="914400" rtl="0" eaLnBrk="1" fontAlgn="auto" latinLnBrk="0" hangingPunct="1">
+                        <a:lnSpc>
+                          <a:spcPct val="100000"/>
+                        </a:lnSpc>
+                        <a:spcBef>
+                          <a:spcPts val="0"/>
+                        </a:spcBef>
+                        <a:spcAft>
+                          <a:spcPts val="0"/>
+                        </a:spcAft>
+                        <a:buClrTx/>
+                        <a:buSzTx/>
+                        <a:buFontTx/>
+                        <a:buNone/>
+                        <a:tabLst/>
+                        <a:defRPr/>
+                      </a:pPr>
+                      <a:r>
+                        <a:rPr lang="en-US" sz="1300" dirty="0" smtClean="0"/>
+                        <a:t>A person not a student not pensioner</a:t>
+                      </a:r>
+                    </a:p>
+                  </a:txBody>
+                  <a:tcPr marL="87285" marR="87285" marT="43642" marB="43642"/>
+                </a:tc>
+                <a:tc>
+                  <a:txBody>
+                    <a:bodyPr/>
+                    <a:lstStyle/>
+                    <a:p>
+                      <a:pPr marL="0" marR="0" indent="0" algn="l" defTabSz="914400" rtl="0" eaLnBrk="1" fontAlgn="auto" latinLnBrk="0" hangingPunct="1">
+                        <a:lnSpc>
+                          <a:spcPct val="100000"/>
+                        </a:lnSpc>
+                        <a:spcBef>
+                          <a:spcPts val="0"/>
+                        </a:spcBef>
+                        <a:spcAft>
+                          <a:spcPts val="0"/>
+                        </a:spcAft>
+                        <a:buClrTx/>
+                        <a:buSzTx/>
+                        <a:buFontTx/>
+                        <a:buNone/>
+                        <a:tabLst/>
+                        <a:defRPr/>
+                      </a:pPr>
+                      <a:r>
+                        <a:rPr lang="en-US" sz="1300" baseline="0" dirty="0" smtClean="0"/>
+                        <a:t>No </a:t>
+                      </a:r>
+                      <a:r>
+                        <a:rPr lang="en-US" sz="1300" dirty="0" smtClean="0"/>
+                        <a:t>discount will be given for the travel card</a:t>
+                      </a:r>
+                    </a:p>
+                  </a:txBody>
+                  <a:tcPr marL="87285" marR="87285" marT="43642" marB="43642"/>
+                </a:tc>
+              </a:tr>
+            </a:tbl>
+          </a:graphicData>
+        </a:graphic>
+      </p:graphicFrame>
+    </p:spTree>
+    <p:extLst>
+      <p:ext uri="{BB962C8B-B14F-4D97-AF65-F5344CB8AC3E}">
+        <p14:creationId xmlns:p14="http://schemas.microsoft.com/office/powerpoint/2010/main" val="1072791779"/>
+      </p:ext>
+    </p:extLst>
+  </p:cSld>
+  <p:clrMapOvr>
+    <a:masterClrMapping/>
+  </p:clrMapOvr>
+</p:sld>
+</file>
+
+<file path=ppt/slides/slide6.xml><?xml version="1.0" encoding="utf-8"?>
+<p:sld xmlns:a="http://schemas.openxmlformats.org/drawingml/2006/main" xmlns:r="http://schemas.openxmlformats.org/officeDocument/2006/relationships" xmlns:p="http://schemas.openxmlformats.org/presentationml/2006/main">
+  <p:cSld>
+    <p:spTree>
+      <p:nvGrpSpPr>
+        <p:cNvPr id="1" name=""/>
+        <p:cNvGrpSpPr/>
+        <p:nvPr/>
+      </p:nvGrpSpPr>
+      <p:grpSpPr>
+        <a:xfrm>
+          <a:off x="0" y="0"/>
+          <a:ext cx="0" cy="0"/>
+          <a:chOff x="0" y="0"/>
+          <a:chExt cx="0" cy="0"/>
+        </a:xfrm>
+      </p:grpSpPr>
+      <p:sp>
+        <p:nvSpPr>
+          <p:cNvPr id="3" name="Content Placeholder 2"/>
+          <p:cNvSpPr>
+            <a:spLocks noGrp="1"/>
+          </p:cNvSpPr>
+          <p:nvPr>
+            <p:ph idx="1"/>
+          </p:nvPr>
+        </p:nvSpPr>
+        <p:spPr>
+          <a:xfrm>
+            <a:off x="838200" y="610236"/>
+            <a:ext cx="10515600" cy="1437506"/>
+          </a:xfrm>
+        </p:spPr>
+        <p:txBody>
+          <a:bodyPr>
+            <a:normAutofit/>
+          </a:bodyPr>
+          <a:lstStyle/>
+          <a:p>
+            <a:pPr marL="0" indent="0">
+              <a:buNone/>
+            </a:pPr>
+            <a:r>
+              <a:rPr lang="en-US" sz="1600" dirty="0" smtClean="0"/>
+              <a:t>State transition User wants to pay for using the Internet with Payment card. He enters amount of money he needs to pay, e-mail and press the “Next” button. If entered amount of money is not allowed the user will be asked to correct the sum. In other case will be redirected on payment page. On this page user should enter the 16-digit number of card, period of validity and code of CVV2/CVC2 and then press “Pay”. If entered info is correct user will get email-notification on his email that operation completed success. If some data were entered incorrectly, user will get error-notification on the screen and he should correct it and again press “Pay”.</a:t>
+            </a:r>
+          </a:p>
+        </p:txBody>
+      </p:sp>
+      <p:sp>
+        <p:nvSpPr>
+          <p:cNvPr id="4" name="Title 1"/>
+          <p:cNvSpPr>
+            <a:spLocks noGrp="1"/>
+          </p:cNvSpPr>
+          <p:nvPr>
+            <p:ph type="title"/>
+          </p:nvPr>
+        </p:nvSpPr>
+        <p:spPr>
+          <a:xfrm>
+            <a:off x="838200" y="159084"/>
+            <a:ext cx="10515600" cy="451151"/>
+          </a:xfrm>
+        </p:spPr>
+        <p:txBody>
+          <a:bodyPr>
+            <a:normAutofit/>
+          </a:bodyPr>
+          <a:lstStyle/>
+          <a:p>
+            <a:r>
+              <a:rPr lang="en-US" sz="2400" b="1" dirty="0" smtClean="0">
+                <a:solidFill>
+                  <a:schemeClr val="accent1">
+                    <a:lumMod val="75000"/>
+                  </a:schemeClr>
+                </a:solidFill>
+              </a:rPr>
               <a:t>State Transition Diagram</a:t>
             </a:r>
-            <a:endParaRPr lang="en-US" sz="3200" dirty="0"/>
+            <a:endParaRPr lang="en-US" sz="2400" b="1" dirty="0">
+              <a:solidFill>
+                <a:schemeClr val="accent1">
+                  <a:lumMod val="75000"/>
+                </a:schemeClr>
+              </a:solidFill>
+            </a:endParaRPr>
           </a:p>
         </p:txBody>
       </p:sp>
       <p:pic>
         <p:nvPicPr>
-          <p:cNvPr id="6" name="Picture 5"/>
+          <p:cNvPr id="5" name="Picture 4"/>
           <p:cNvPicPr>
             <a:picLocks noChangeAspect="1"/>
           </p:cNvPicPr>
@@ -9498,8 +10876,8 @@
         </p:blipFill>
         <p:spPr>
           <a:xfrm>
-            <a:off x="838200" y="2563597"/>
-            <a:ext cx="10919962" cy="3025833"/>
+            <a:off x="1052348" y="2205395"/>
+            <a:ext cx="10087303" cy="4369023"/>
           </a:xfrm>
           <a:prstGeom prst="rect">
             <a:avLst/>
@@ -9778,4 +11156,265 @@
     </a:ext>
   </a:extLst>
 </a:theme>
+</file>
+
+<file path=ppt/theme/theme2.xml><?xml version="1.0" encoding="utf-8"?>
+<a:theme xmlns:a="http://schemas.openxmlformats.org/drawingml/2006/main" name="Office Theme">
+  <a:themeElements>
+    <a:clrScheme name="Office">
+      <a:dk1>
+        <a:sysClr val="windowText" lastClr="000000"/>
+      </a:dk1>
+      <a:lt1>
+        <a:sysClr val="window" lastClr="FFFFFF"/>
+      </a:lt1>
+      <a:dk2>
+        <a:srgbClr val="44546A"/>
+      </a:dk2>
+      <a:lt2>
+        <a:srgbClr val="E7E6E6"/>
+      </a:lt2>
+      <a:accent1>
+        <a:srgbClr val="5B9BD5"/>
+      </a:accent1>
+      <a:accent2>
+        <a:srgbClr val="ED7D31"/>
+      </a:accent2>
+      <a:accent3>
+        <a:srgbClr val="A5A5A5"/>
+      </a:accent3>
+      <a:accent4>
+        <a:srgbClr val="FFC000"/>
+      </a:accent4>
+      <a:accent5>
+        <a:srgbClr val="4472C4"/>
+      </a:accent5>
+      <a:accent6>
+        <a:srgbClr val="70AD47"/>
+      </a:accent6>
+      <a:hlink>
+        <a:srgbClr val="0563C1"/>
+      </a:hlink>
+      <a:folHlink>
+        <a:srgbClr val="954F72"/>
+      </a:folHlink>
+    </a:clrScheme>
+    <a:fontScheme name="Office">
+      <a:majorFont>
+        <a:latin typeface="Calibri Light" panose="020F0302020204030204"/>
+        <a:ea typeface=""/>
+        <a:cs typeface=""/>
+        <a:font script="Jpan" typeface="ＭＳ Ｐゴシック"/>
+        <a:font script="Hang" typeface="맑은 고딕"/>
+        <a:font script="Hans" typeface="宋体"/>
+        <a:font script="Hant" typeface="新細明體"/>
+        <a:font script="Arab" typeface="Times New Roman"/>
+        <a:font script="Hebr" typeface="Times New Roman"/>
+        <a:font script="Thai" typeface="Angsana New"/>
+        <a:font script="Ethi" typeface="Nyala"/>
+        <a:font script="Beng" typeface="Vrinda"/>
+        <a:font script="Gujr" typeface="Shruti"/>
+        <a:font script="Khmr" typeface="MoolBoran"/>
+        <a:font script="Knda" typeface="Tunga"/>
+        <a:font script="Guru" typeface="Raavi"/>
+        <a:font script="Cans" typeface="Euphemia"/>
+        <a:font script="Cher" typeface="Plantagenet Cherokee"/>
+        <a:font script="Yiii" typeface="Microsoft Yi Baiti"/>
+        <a:font script="Tibt" typeface="Microsoft Himalaya"/>
+        <a:font script="Thaa" typeface="MV Boli"/>
+        <a:font script="Deva" typeface="Mangal"/>
+        <a:font script="Telu" typeface="Gautami"/>
+        <a:font script="Taml" typeface="Latha"/>
+        <a:font script="Syrc" typeface="Estrangelo Edessa"/>
+        <a:font script="Orya" typeface="Kalinga"/>
+        <a:font script="Mlym" typeface="Kartika"/>
+        <a:font script="Laoo" typeface="DokChampa"/>
+        <a:font script="Sinh" typeface="Iskoola Pota"/>
+        <a:font script="Mong" typeface="Mongolian Baiti"/>
+        <a:font script="Viet" typeface="Times New Roman"/>
+        <a:font script="Uigh" typeface="Microsoft Uighur"/>
+        <a:font script="Geor" typeface="Sylfaen"/>
+      </a:majorFont>
+      <a:minorFont>
+        <a:latin typeface="Calibri" panose="020F0502020204030204"/>
+        <a:ea typeface=""/>
+        <a:cs typeface=""/>
+        <a:font script="Jpan" typeface="ＭＳ Ｐゴシック"/>
+        <a:font script="Hang" typeface="맑은 고딕"/>
+        <a:font script="Hans" typeface="宋体"/>
+        <a:font script="Hant" typeface="新細明體"/>
+        <a:font script="Arab" typeface="Arial"/>
+        <a:font script="Hebr" typeface="Arial"/>
+        <a:font script="Thai" typeface="Cordia New"/>
+        <a:font script="Ethi" typeface="Nyala"/>
+        <a:font script="Beng" typeface="Vrinda"/>
+        <a:font script="Gujr" typeface="Shruti"/>
+        <a:font script="Khmr" typeface="DaunPenh"/>
+        <a:font script="Knda" typeface="Tunga"/>
+        <a:font script="Guru" typeface="Raavi"/>
+        <a:font script="Cans" typeface="Euphemia"/>
+        <a:font script="Cher" typeface="Plantagenet Cherokee"/>
+        <a:font script="Yiii" typeface="Microsoft Yi Baiti"/>
+        <a:font script="Tibt" typeface="Microsoft Himalaya"/>
+        <a:font script="Thaa" typeface="MV Boli"/>
+        <a:font script="Deva" typeface="Mangal"/>
+        <a:font script="Telu" typeface="Gautami"/>
+        <a:font script="Taml" typeface="Latha"/>
+        <a:font script="Syrc" typeface="Estrangelo Edessa"/>
+        <a:font script="Orya" typeface="Kalinga"/>
+        <a:font script="Mlym" typeface="Kartika"/>
+        <a:font script="Laoo" typeface="DokChampa"/>
+        <a:font script="Sinh" typeface="Iskoola Pota"/>
+        <a:font script="Mong" typeface="Mongolian Baiti"/>
+        <a:font script="Viet" typeface="Arial"/>
+        <a:font script="Uigh" typeface="Microsoft Uighur"/>
+        <a:font script="Geor" typeface="Sylfaen"/>
+      </a:minorFont>
+    </a:fontScheme>
+    <a:fmtScheme name="Office">
+      <a:fillStyleLst>
+        <a:solidFill>
+          <a:schemeClr val="phClr"/>
+        </a:solidFill>
+        <a:gradFill rotWithShape="1">
+          <a:gsLst>
+            <a:gs pos="0">
+              <a:schemeClr val="phClr">
+                <a:lumMod val="110000"/>
+                <a:satMod val="105000"/>
+                <a:tint val="67000"/>
+              </a:schemeClr>
+            </a:gs>
+            <a:gs pos="50000">
+              <a:schemeClr val="phClr">
+                <a:lumMod val="105000"/>
+                <a:satMod val="103000"/>
+                <a:tint val="73000"/>
+              </a:schemeClr>
+            </a:gs>
+            <a:gs pos="100000">
+              <a:schemeClr val="phClr">
+                <a:lumMod val="105000"/>
+                <a:satMod val="109000"/>
+                <a:tint val="81000"/>
+              </a:schemeClr>
+            </a:gs>
+          </a:gsLst>
+          <a:lin ang="5400000" scaled="0"/>
+        </a:gradFill>
+        <a:gradFill rotWithShape="1">
+          <a:gsLst>
+            <a:gs pos="0">
+              <a:schemeClr val="phClr">
+                <a:satMod val="103000"/>
+                <a:lumMod val="102000"/>
+                <a:tint val="94000"/>
+              </a:schemeClr>
+            </a:gs>
+            <a:gs pos="50000">
+              <a:schemeClr val="phClr">
+                <a:satMod val="110000"/>
+                <a:lumMod val="100000"/>
+                <a:shade val="100000"/>
+              </a:schemeClr>
+            </a:gs>
+            <a:gs pos="100000">
+              <a:schemeClr val="phClr">
+                <a:lumMod val="99000"/>
+                <a:satMod val="120000"/>
+                <a:shade val="78000"/>
+              </a:schemeClr>
+            </a:gs>
+          </a:gsLst>
+          <a:lin ang="5400000" scaled="0"/>
+        </a:gradFill>
+      </a:fillStyleLst>
+      <a:lnStyleLst>
+        <a:ln w="6350" cap="flat" cmpd="sng" algn="ctr">
+          <a:solidFill>
+            <a:schemeClr val="phClr"/>
+          </a:solidFill>
+          <a:prstDash val="solid"/>
+          <a:miter lim="800000"/>
+        </a:ln>
+        <a:ln w="12700" cap="flat" cmpd="sng" algn="ctr">
+          <a:solidFill>
+            <a:schemeClr val="phClr"/>
+          </a:solidFill>
+          <a:prstDash val="solid"/>
+          <a:miter lim="800000"/>
+        </a:ln>
+        <a:ln w="19050" cap="flat" cmpd="sng" algn="ctr">
+          <a:solidFill>
+            <a:schemeClr val="phClr"/>
+          </a:solidFill>
+          <a:prstDash val="solid"/>
+          <a:miter lim="800000"/>
+        </a:ln>
+      </a:lnStyleLst>
+      <a:effectStyleLst>
+        <a:effectStyle>
+          <a:effectLst/>
+        </a:effectStyle>
+        <a:effectStyle>
+          <a:effectLst/>
+        </a:effectStyle>
+        <a:effectStyle>
+          <a:effectLst>
+            <a:outerShdw blurRad="57150" dist="19050" dir="5400000" algn="ctr" rotWithShape="0">
+              <a:srgbClr val="000000">
+                <a:alpha val="63000"/>
+              </a:srgbClr>
+            </a:outerShdw>
+          </a:effectLst>
+        </a:effectStyle>
+      </a:effectStyleLst>
+      <a:bgFillStyleLst>
+        <a:solidFill>
+          <a:schemeClr val="phClr"/>
+        </a:solidFill>
+        <a:solidFill>
+          <a:schemeClr val="phClr">
+            <a:tint val="95000"/>
+            <a:satMod val="170000"/>
+          </a:schemeClr>
+        </a:solidFill>
+        <a:gradFill rotWithShape="1">
+          <a:gsLst>
+            <a:gs pos="0">
+              <a:schemeClr val="phClr">
+                <a:tint val="93000"/>
+                <a:satMod val="150000"/>
+                <a:shade val="98000"/>
+                <a:lumMod val="102000"/>
+              </a:schemeClr>
+            </a:gs>
+            <a:gs pos="50000">
+              <a:schemeClr val="phClr">
+                <a:tint val="98000"/>
+                <a:satMod val="130000"/>
+                <a:shade val="90000"/>
+                <a:lumMod val="103000"/>
+              </a:schemeClr>
+            </a:gs>
+            <a:gs pos="100000">
+              <a:schemeClr val="phClr">
+                <a:shade val="63000"/>
+                <a:satMod val="120000"/>
+              </a:schemeClr>
+            </a:gs>
+          </a:gsLst>
+          <a:lin ang="5400000" scaled="0"/>
+        </a:gradFill>
+      </a:bgFillStyleLst>
+    </a:fmtScheme>
+  </a:themeElements>
+  <a:objectDefaults/>
+  <a:extraClrSchemeLst/>
+  <a:extLst>
+    <a:ext uri="{05A4C25C-085E-4340-85A3-A5531E510DB2}">
+      <thm15:themeFamily xmlns:thm15="http://schemas.microsoft.com/office/thememl/2012/main" name="Office Theme" id="{62F939B6-93AF-4DB8-9C6B-D6C7DFDC589F}" vid="{4A3C46E8-61CC-4603-A589-7422A47A8E4A}"/>
+    </a:ext>
+  </a:extLst>
+</a:theme>
 </file>
</xml_diff>